<commit_message>
Add HTTP Protocol browser example
</commit_message>
<xml_diff>
--- a/Network Parts and Terms.pptx
+++ b/Network Parts and Terms.pptx
@@ -8,6 +8,7 @@
     <p:sldId id="256" r:id="rId2"/>
     <p:sldId id="273" r:id="rId3"/>
     <p:sldId id="274" r:id="rId4"/>
+    <p:sldId id="275" r:id="rId5"/>
   </p:sldIdLst>
   <p:sldSz cx="12192000" cy="6858000"/>
   <p:notesSz cx="6858000" cy="9144000"/>
@@ -261,7 +262,7 @@
           <a:p>
             <a:fld id="{06ADBE60-9DBF-4AEC-B933-FFCA020856EA}" type="datetimeFigureOut">
               <a:rPr lang="en-US" smtClean="0"/>
-              <a:t>9/4/2020</a:t>
+              <a:t>9/10/2020</a:t>
             </a:fld>
             <a:endParaRPr lang="en-US"/>
           </a:p>
@@ -459,7 +460,7 @@
           <a:p>
             <a:fld id="{06ADBE60-9DBF-4AEC-B933-FFCA020856EA}" type="datetimeFigureOut">
               <a:rPr lang="en-US" smtClean="0"/>
-              <a:t>9/4/2020</a:t>
+              <a:t>9/10/2020</a:t>
             </a:fld>
             <a:endParaRPr lang="en-US"/>
           </a:p>
@@ -667,7 +668,7 @@
           <a:p>
             <a:fld id="{06ADBE60-9DBF-4AEC-B933-FFCA020856EA}" type="datetimeFigureOut">
               <a:rPr lang="en-US" smtClean="0"/>
-              <a:t>9/4/2020</a:t>
+              <a:t>9/10/2020</a:t>
             </a:fld>
             <a:endParaRPr lang="en-US"/>
           </a:p>
@@ -865,7 +866,7 @@
           <a:p>
             <a:fld id="{06ADBE60-9DBF-4AEC-B933-FFCA020856EA}" type="datetimeFigureOut">
               <a:rPr lang="en-US" smtClean="0"/>
-              <a:t>9/4/2020</a:t>
+              <a:t>9/10/2020</a:t>
             </a:fld>
             <a:endParaRPr lang="en-US"/>
           </a:p>
@@ -1140,7 +1141,7 @@
           <a:p>
             <a:fld id="{06ADBE60-9DBF-4AEC-B933-FFCA020856EA}" type="datetimeFigureOut">
               <a:rPr lang="en-US" smtClean="0"/>
-              <a:t>9/4/2020</a:t>
+              <a:t>9/10/2020</a:t>
             </a:fld>
             <a:endParaRPr lang="en-US"/>
           </a:p>
@@ -1405,7 +1406,7 @@
           <a:p>
             <a:fld id="{06ADBE60-9DBF-4AEC-B933-FFCA020856EA}" type="datetimeFigureOut">
               <a:rPr lang="en-US" smtClean="0"/>
-              <a:t>9/4/2020</a:t>
+              <a:t>9/10/2020</a:t>
             </a:fld>
             <a:endParaRPr lang="en-US"/>
           </a:p>
@@ -1817,7 +1818,7 @@
           <a:p>
             <a:fld id="{06ADBE60-9DBF-4AEC-B933-FFCA020856EA}" type="datetimeFigureOut">
               <a:rPr lang="en-US" smtClean="0"/>
-              <a:t>9/4/2020</a:t>
+              <a:t>9/10/2020</a:t>
             </a:fld>
             <a:endParaRPr lang="en-US"/>
           </a:p>
@@ -1958,7 +1959,7 @@
           <a:p>
             <a:fld id="{06ADBE60-9DBF-4AEC-B933-FFCA020856EA}" type="datetimeFigureOut">
               <a:rPr lang="en-US" smtClean="0"/>
-              <a:t>9/4/2020</a:t>
+              <a:t>9/10/2020</a:t>
             </a:fld>
             <a:endParaRPr lang="en-US"/>
           </a:p>
@@ -2071,7 +2072,7 @@
           <a:p>
             <a:fld id="{06ADBE60-9DBF-4AEC-B933-FFCA020856EA}" type="datetimeFigureOut">
               <a:rPr lang="en-US" smtClean="0"/>
-              <a:t>9/4/2020</a:t>
+              <a:t>9/10/2020</a:t>
             </a:fld>
             <a:endParaRPr lang="en-US"/>
           </a:p>
@@ -2382,7 +2383,7 @@
           <a:p>
             <a:fld id="{06ADBE60-9DBF-4AEC-B933-FFCA020856EA}" type="datetimeFigureOut">
               <a:rPr lang="en-US" smtClean="0"/>
-              <a:t>9/4/2020</a:t>
+              <a:t>9/10/2020</a:t>
             </a:fld>
             <a:endParaRPr lang="en-US"/>
           </a:p>
@@ -2670,7 +2671,7 @@
           <a:p>
             <a:fld id="{06ADBE60-9DBF-4AEC-B933-FFCA020856EA}" type="datetimeFigureOut">
               <a:rPr lang="en-US" smtClean="0"/>
-              <a:t>9/4/2020</a:t>
+              <a:t>9/10/2020</a:t>
             </a:fld>
             <a:endParaRPr lang="en-US"/>
           </a:p>
@@ -2911,7 +2912,7 @@
           <a:p>
             <a:fld id="{06ADBE60-9DBF-4AEC-B933-FFCA020856EA}" type="datetimeFigureOut">
               <a:rPr lang="en-US" smtClean="0"/>
-              <a:t>9/4/2020</a:t>
+              <a:t>9/10/2020</a:t>
             </a:fld>
             <a:endParaRPr lang="en-US"/>
           </a:p>
@@ -3007,6 +3008,36 @@
           </a:p>
         </p:txBody>
       </p:sp>
+      <p:pic>
+        <p:nvPicPr>
+          <p:cNvPr id="8" name="Picture 7">
+            <a:extLst>
+              <a:ext uri="{FF2B5EF4-FFF2-40B4-BE49-F238E27FC236}">
+                <a16:creationId xmlns:a16="http://schemas.microsoft.com/office/drawing/2014/main" id="{F067C4BD-2F9E-4D3F-A05F-432C853B4EEF}"/>
+              </a:ext>
+            </a:extLst>
+          </p:cNvPr>
+          <p:cNvPicPr>
+            <a:picLocks noChangeAspect="1"/>
+          </p:cNvPicPr>
+          <p:nvPr userDrawn="1"/>
+        </p:nvPicPr>
+        <p:blipFill>
+          <a:blip r:embed="rId13"/>
+          <a:stretch>
+            <a:fillRect/>
+          </a:stretch>
+        </p:blipFill>
+        <p:spPr>
+          <a:xfrm>
+            <a:off x="10977329" y="6240512"/>
+            <a:ext cx="1019175" cy="466725"/>
+          </a:xfrm>
+          <a:prstGeom prst="rect">
+            <a:avLst/>
+          </a:prstGeom>
+        </p:spPr>
+      </p:pic>
     </p:spTree>
     <p:extLst>
       <p:ext uri="{BB962C8B-B14F-4D97-AF65-F5344CB8AC3E}">
@@ -4554,36 +4585,6 @@
           </p:txBody>
         </p:sp>
       </p:grpSp>
-      <p:pic>
-        <p:nvPicPr>
-          <p:cNvPr id="4" name="Picture 3">
-            <a:extLst>
-              <a:ext uri="{FF2B5EF4-FFF2-40B4-BE49-F238E27FC236}">
-                <a16:creationId xmlns:a16="http://schemas.microsoft.com/office/drawing/2014/main" id="{47D7EDF9-CA5A-4051-9D0B-525F27058055}"/>
-              </a:ext>
-            </a:extLst>
-          </p:cNvPr>
-          <p:cNvPicPr>
-            <a:picLocks noChangeAspect="1"/>
-          </p:cNvPicPr>
-          <p:nvPr/>
-        </p:nvPicPr>
-        <p:blipFill>
-          <a:blip r:embed="rId3"/>
-          <a:stretch>
-            <a:fillRect/>
-          </a:stretch>
-        </p:blipFill>
-        <p:spPr>
-          <a:xfrm>
-            <a:off x="10977329" y="6240512"/>
-            <a:ext cx="1019175" cy="466725"/>
-          </a:xfrm>
-          <a:prstGeom prst="rect">
-            <a:avLst/>
-          </a:prstGeom>
-        </p:spPr>
-      </p:pic>
     </p:spTree>
     <p:extLst>
       <p:ext uri="{BB962C8B-B14F-4D97-AF65-F5344CB8AC3E}">
@@ -6625,36 +6626,6 @@
           </a:p>
         </p:txBody>
       </p:sp>
-      <p:pic>
-        <p:nvPicPr>
-          <p:cNvPr id="3" name="Picture 2">
-            <a:extLst>
-              <a:ext uri="{FF2B5EF4-FFF2-40B4-BE49-F238E27FC236}">
-                <a16:creationId xmlns:a16="http://schemas.microsoft.com/office/drawing/2014/main" id="{BDC23FED-945A-4ADD-A2D6-3B66159EB3BB}"/>
-              </a:ext>
-            </a:extLst>
-          </p:cNvPr>
-          <p:cNvPicPr>
-            <a:picLocks noChangeAspect="1"/>
-          </p:cNvPicPr>
-          <p:nvPr/>
-        </p:nvPicPr>
-        <p:blipFill>
-          <a:blip r:embed="rId3"/>
-          <a:stretch>
-            <a:fillRect/>
-          </a:stretch>
-        </p:blipFill>
-        <p:spPr>
-          <a:xfrm>
-            <a:off x="10977329" y="6240512"/>
-            <a:ext cx="1019175" cy="466725"/>
-          </a:xfrm>
-          <a:prstGeom prst="rect">
-            <a:avLst/>
-          </a:prstGeom>
-        </p:spPr>
-      </p:pic>
     </p:spTree>
     <p:extLst>
       <p:ext uri="{BB962C8B-B14F-4D97-AF65-F5344CB8AC3E}">
@@ -8136,40 +8107,2046 @@
           </a:p>
         </p:txBody>
       </p:sp>
-      <p:pic>
-        <p:nvPicPr>
-          <p:cNvPr id="14" name="Picture 13">
-            <a:extLst>
-              <a:ext uri="{FF2B5EF4-FFF2-40B4-BE49-F238E27FC236}">
-                <a16:creationId xmlns:a16="http://schemas.microsoft.com/office/drawing/2014/main" id="{20314AB4-156F-4436-A037-64402465823C}"/>
-              </a:ext>
-            </a:extLst>
-          </p:cNvPr>
-          <p:cNvPicPr>
-            <a:picLocks noChangeAspect="1"/>
-          </p:cNvPicPr>
-          <p:nvPr/>
-        </p:nvPicPr>
-        <p:blipFill>
-          <a:blip r:embed="rId2"/>
-          <a:stretch>
-            <a:fillRect/>
-          </a:stretch>
-        </p:blipFill>
-        <p:spPr>
-          <a:xfrm>
-            <a:off x="10977329" y="6240512"/>
-            <a:ext cx="1019175" cy="466725"/>
-          </a:xfrm>
-          <a:prstGeom prst="rect">
-            <a:avLst/>
-          </a:prstGeom>
-        </p:spPr>
-      </p:pic>
     </p:spTree>
     <p:extLst>
       <p:ext uri="{BB962C8B-B14F-4D97-AF65-F5344CB8AC3E}">
         <p14:creationId xmlns:p14="http://schemas.microsoft.com/office/powerpoint/2010/main" val="200859694"/>
+      </p:ext>
+    </p:extLst>
+  </p:cSld>
+  <p:clrMapOvr>
+    <a:masterClrMapping/>
+  </p:clrMapOvr>
+</p:sld>
+</file>
+
+<file path=ppt/slides/slide4.xml><?xml version="1.0" encoding="utf-8"?>
+<p:sld xmlns:a="http://schemas.openxmlformats.org/drawingml/2006/main" xmlns:r="http://schemas.openxmlformats.org/officeDocument/2006/relationships" xmlns:p="http://schemas.openxmlformats.org/presentationml/2006/main">
+  <p:cSld>
+    <p:spTree>
+      <p:nvGrpSpPr>
+        <p:cNvPr id="1" name=""/>
+        <p:cNvGrpSpPr/>
+        <p:nvPr/>
+      </p:nvGrpSpPr>
+      <p:grpSpPr>
+        <a:xfrm>
+          <a:off x="0" y="0"/>
+          <a:ext cx="0" cy="0"/>
+          <a:chOff x="0" y="0"/>
+          <a:chExt cx="0" cy="0"/>
+        </a:xfrm>
+      </p:grpSpPr>
+      <p:sp>
+        <p:nvSpPr>
+          <p:cNvPr id="2" name="Rectangle 1" hidden="1">
+            <a:extLst>
+              <a:ext uri="{FF2B5EF4-FFF2-40B4-BE49-F238E27FC236}">
+                <a16:creationId xmlns:a16="http://schemas.microsoft.com/office/drawing/2014/main" id="{5CCCBFA1-FDCD-4E57-81CE-6E0F8D7901BF}"/>
+              </a:ext>
+            </a:extLst>
+          </p:cNvPr>
+          <p:cNvSpPr/>
+          <p:nvPr/>
+        </p:nvSpPr>
+        <p:spPr>
+          <a:xfrm>
+            <a:off x="0" y="0"/>
+            <a:ext cx="12192000" cy="6858000"/>
+          </a:xfrm>
+          <a:prstGeom prst="rect">
+            <a:avLst/>
+          </a:prstGeom>
+          <a:solidFill>
+            <a:schemeClr val="bg1"/>
+          </a:solidFill>
+          <a:ln>
+            <a:noFill/>
+          </a:ln>
+        </p:spPr>
+        <p:style>
+          <a:lnRef idx="2">
+            <a:schemeClr val="accent1">
+              <a:shade val="50000"/>
+            </a:schemeClr>
+          </a:lnRef>
+          <a:fillRef idx="1">
+            <a:schemeClr val="accent1"/>
+          </a:fillRef>
+          <a:effectRef idx="0">
+            <a:schemeClr val="accent1"/>
+          </a:effectRef>
+          <a:fontRef idx="minor">
+            <a:schemeClr val="lt1"/>
+          </a:fontRef>
+        </p:style>
+        <p:txBody>
+          <a:bodyPr rtlCol="0" anchor="ctr"/>
+          <a:lstStyle/>
+          <a:p>
+            <a:pPr algn="ctr"/>
+            <a:endParaRPr lang="en-US" dirty="0"/>
+          </a:p>
+        </p:txBody>
+      </p:sp>
+      <p:sp>
+        <p:nvSpPr>
+          <p:cNvPr id="38" name="TextBox 37">
+            <a:extLst>
+              <a:ext uri="{FF2B5EF4-FFF2-40B4-BE49-F238E27FC236}">
+                <a16:creationId xmlns:a16="http://schemas.microsoft.com/office/drawing/2014/main" id="{91D2CAB9-EF2E-4B5B-B20A-806B6DD60F42}"/>
+              </a:ext>
+            </a:extLst>
+          </p:cNvPr>
+          <p:cNvSpPr txBox="1"/>
+          <p:nvPr/>
+        </p:nvSpPr>
+        <p:spPr>
+          <a:xfrm>
+            <a:off x="3397135" y="250222"/>
+            <a:ext cx="5397730" cy="523220"/>
+          </a:xfrm>
+          <a:prstGeom prst="rect">
+            <a:avLst/>
+          </a:prstGeom>
+          <a:noFill/>
+        </p:spPr>
+        <p:txBody>
+          <a:bodyPr wrap="square" rtlCol="0">
+            <a:spAutoFit/>
+          </a:bodyPr>
+          <a:lstStyle/>
+          <a:p>
+            <a:pPr algn="ctr"/>
+            <a:r>
+              <a:rPr lang="en-US" sz="2800" dirty="0">
+                <a:solidFill>
+                  <a:schemeClr val="accent6">
+                    <a:lumMod val="75000"/>
+                  </a:schemeClr>
+                </a:solidFill>
+              </a:rPr>
+              <a:t>HTTP Protocol—Browser Example</a:t>
+            </a:r>
+          </a:p>
+        </p:txBody>
+      </p:sp>
+      <p:grpSp>
+        <p:nvGrpSpPr>
+          <p:cNvPr id="49" name="Group 48">
+            <a:extLst>
+              <a:ext uri="{FF2B5EF4-FFF2-40B4-BE49-F238E27FC236}">
+                <a16:creationId xmlns:a16="http://schemas.microsoft.com/office/drawing/2014/main" id="{B8CE06AF-2806-4107-95D9-AAC286CC343B}"/>
+              </a:ext>
+            </a:extLst>
+          </p:cNvPr>
+          <p:cNvGrpSpPr/>
+          <p:nvPr/>
+        </p:nvGrpSpPr>
+        <p:grpSpPr>
+          <a:xfrm>
+            <a:off x="3766877" y="629685"/>
+            <a:ext cx="4498072" cy="297874"/>
+            <a:chOff x="3971469" y="624781"/>
+            <a:chExt cx="4498072" cy="297874"/>
+          </a:xfrm>
+        </p:grpSpPr>
+        <p:cxnSp>
+          <p:nvCxnSpPr>
+            <p:cNvPr id="40" name="Straight Connector 39">
+              <a:extLst>
+                <a:ext uri="{FF2B5EF4-FFF2-40B4-BE49-F238E27FC236}">
+                  <a16:creationId xmlns:a16="http://schemas.microsoft.com/office/drawing/2014/main" id="{D6E0AC31-61D0-4CE2-AA3B-3C6978E8704A}"/>
+                </a:ext>
+              </a:extLst>
+            </p:cNvPr>
+            <p:cNvCxnSpPr/>
+            <p:nvPr/>
+          </p:nvCxnSpPr>
+          <p:spPr>
+            <a:xfrm>
+              <a:off x="5170031" y="773442"/>
+              <a:ext cx="2057400" cy="0"/>
+            </a:xfrm>
+            <a:prstGeom prst="line">
+              <a:avLst/>
+            </a:prstGeom>
+            <a:ln cap="rnd"/>
+          </p:spPr>
+          <p:style>
+            <a:lnRef idx="3">
+              <a:schemeClr val="accent6"/>
+            </a:lnRef>
+            <a:fillRef idx="0">
+              <a:schemeClr val="accent6"/>
+            </a:fillRef>
+            <a:effectRef idx="2">
+              <a:schemeClr val="accent6"/>
+            </a:effectRef>
+            <a:fontRef idx="minor">
+              <a:schemeClr val="tx1"/>
+            </a:fontRef>
+          </p:style>
+        </p:cxnSp>
+        <p:cxnSp>
+          <p:nvCxnSpPr>
+            <p:cNvPr id="41" name="Straight Connector 40">
+              <a:extLst>
+                <a:ext uri="{FF2B5EF4-FFF2-40B4-BE49-F238E27FC236}">
+                  <a16:creationId xmlns:a16="http://schemas.microsoft.com/office/drawing/2014/main" id="{B388F3BF-FB37-4435-8519-443F06647178}"/>
+                </a:ext>
+              </a:extLst>
+            </p:cNvPr>
+            <p:cNvCxnSpPr>
+              <a:cxnSpLocks/>
+            </p:cNvCxnSpPr>
+            <p:nvPr/>
+          </p:nvCxnSpPr>
+          <p:spPr>
+            <a:xfrm>
+              <a:off x="7349270" y="697242"/>
+              <a:ext cx="1027511" cy="0"/>
+            </a:xfrm>
+            <a:prstGeom prst="line">
+              <a:avLst/>
+            </a:prstGeom>
+            <a:ln cap="rnd"/>
+          </p:spPr>
+          <p:style>
+            <a:lnRef idx="3">
+              <a:schemeClr val="accent6"/>
+            </a:lnRef>
+            <a:fillRef idx="0">
+              <a:schemeClr val="accent6"/>
+            </a:fillRef>
+            <a:effectRef idx="2">
+              <a:schemeClr val="accent6"/>
+            </a:effectRef>
+            <a:fontRef idx="minor">
+              <a:schemeClr val="tx1"/>
+            </a:fontRef>
+          </p:style>
+        </p:cxnSp>
+        <p:cxnSp>
+          <p:nvCxnSpPr>
+            <p:cNvPr id="43" name="Straight Connector 42">
+              <a:extLst>
+                <a:ext uri="{FF2B5EF4-FFF2-40B4-BE49-F238E27FC236}">
+                  <a16:creationId xmlns:a16="http://schemas.microsoft.com/office/drawing/2014/main" id="{EC5F7052-9710-4CD3-8A81-EEE0E9A7244C}"/>
+                </a:ext>
+              </a:extLst>
+            </p:cNvPr>
+            <p:cNvCxnSpPr>
+              <a:cxnSpLocks/>
+            </p:cNvCxnSpPr>
+            <p:nvPr/>
+          </p:nvCxnSpPr>
+          <p:spPr>
+            <a:xfrm flipV="1">
+              <a:off x="7227431" y="697242"/>
+              <a:ext cx="121839" cy="76200"/>
+            </a:xfrm>
+            <a:prstGeom prst="line">
+              <a:avLst/>
+            </a:prstGeom>
+            <a:ln cap="rnd"/>
+          </p:spPr>
+          <p:style>
+            <a:lnRef idx="3">
+              <a:schemeClr val="accent6"/>
+            </a:lnRef>
+            <a:fillRef idx="0">
+              <a:schemeClr val="accent6"/>
+            </a:fillRef>
+            <a:effectRef idx="2">
+              <a:schemeClr val="accent6"/>
+            </a:effectRef>
+            <a:fontRef idx="minor">
+              <a:schemeClr val="tx1"/>
+            </a:fontRef>
+          </p:style>
+        </p:cxnSp>
+        <p:cxnSp>
+          <p:nvCxnSpPr>
+            <p:cNvPr id="46" name="Straight Connector 45">
+              <a:extLst>
+                <a:ext uri="{FF2B5EF4-FFF2-40B4-BE49-F238E27FC236}">
+                  <a16:creationId xmlns:a16="http://schemas.microsoft.com/office/drawing/2014/main" id="{C86B609C-3E9D-4EA1-9D7B-7AD108C8C57B}"/>
+                </a:ext>
+              </a:extLst>
+            </p:cNvPr>
+            <p:cNvCxnSpPr>
+              <a:cxnSpLocks/>
+            </p:cNvCxnSpPr>
+            <p:nvPr/>
+          </p:nvCxnSpPr>
+          <p:spPr>
+            <a:xfrm flipV="1">
+              <a:off x="5048192" y="773442"/>
+              <a:ext cx="121839" cy="76200"/>
+            </a:xfrm>
+            <a:prstGeom prst="line">
+              <a:avLst/>
+            </a:prstGeom>
+            <a:ln cap="rnd"/>
+          </p:spPr>
+          <p:style>
+            <a:lnRef idx="3">
+              <a:schemeClr val="accent6"/>
+            </a:lnRef>
+            <a:fillRef idx="0">
+              <a:schemeClr val="accent6"/>
+            </a:fillRef>
+            <a:effectRef idx="2">
+              <a:schemeClr val="accent6"/>
+            </a:effectRef>
+            <a:fontRef idx="minor">
+              <a:schemeClr val="tx1"/>
+            </a:fontRef>
+          </p:style>
+        </p:cxnSp>
+        <p:cxnSp>
+          <p:nvCxnSpPr>
+            <p:cNvPr id="47" name="Straight Connector 46">
+              <a:extLst>
+                <a:ext uri="{FF2B5EF4-FFF2-40B4-BE49-F238E27FC236}">
+                  <a16:creationId xmlns:a16="http://schemas.microsoft.com/office/drawing/2014/main" id="{0D690C07-0109-4CEC-B0CC-434EED608911}"/>
+                </a:ext>
+              </a:extLst>
+            </p:cNvPr>
+            <p:cNvCxnSpPr>
+              <a:cxnSpLocks/>
+            </p:cNvCxnSpPr>
+            <p:nvPr/>
+          </p:nvCxnSpPr>
+          <p:spPr>
+            <a:xfrm flipV="1">
+              <a:off x="4021655" y="849642"/>
+              <a:ext cx="1026537" cy="11668"/>
+            </a:xfrm>
+            <a:prstGeom prst="line">
+              <a:avLst/>
+            </a:prstGeom>
+            <a:ln cap="rnd"/>
+          </p:spPr>
+          <p:style>
+            <a:lnRef idx="3">
+              <a:schemeClr val="accent6"/>
+            </a:lnRef>
+            <a:fillRef idx="0">
+              <a:schemeClr val="accent6"/>
+            </a:fillRef>
+            <a:effectRef idx="2">
+              <a:schemeClr val="accent6"/>
+            </a:effectRef>
+            <a:fontRef idx="minor">
+              <a:schemeClr val="tx1"/>
+            </a:fontRef>
+          </p:style>
+        </p:cxnSp>
+        <p:sp>
+          <p:nvSpPr>
+            <p:cNvPr id="50" name="Oval 49">
+              <a:extLst>
+                <a:ext uri="{FF2B5EF4-FFF2-40B4-BE49-F238E27FC236}">
+                  <a16:creationId xmlns:a16="http://schemas.microsoft.com/office/drawing/2014/main" id="{EEA3A56A-D77B-4804-9467-3C2325189A39}"/>
+                </a:ext>
+              </a:extLst>
+            </p:cNvPr>
+            <p:cNvSpPr/>
+            <p:nvPr/>
+          </p:nvSpPr>
+          <p:spPr>
+            <a:xfrm>
+              <a:off x="3971469" y="789305"/>
+              <a:ext cx="133350" cy="133350"/>
+            </a:xfrm>
+            <a:prstGeom prst="ellipse">
+              <a:avLst/>
+            </a:prstGeom>
+          </p:spPr>
+          <p:style>
+            <a:lnRef idx="2">
+              <a:schemeClr val="accent6"/>
+            </a:lnRef>
+            <a:fillRef idx="1">
+              <a:schemeClr val="lt1"/>
+            </a:fillRef>
+            <a:effectRef idx="0">
+              <a:schemeClr val="accent6"/>
+            </a:effectRef>
+            <a:fontRef idx="minor">
+              <a:schemeClr val="dk1"/>
+            </a:fontRef>
+          </p:style>
+          <p:txBody>
+            <a:bodyPr rtlCol="0" anchor="ctr"/>
+            <a:lstStyle/>
+            <a:p>
+              <a:pPr algn="ctr"/>
+              <a:endParaRPr lang="en-US" i="1" dirty="0"/>
+            </a:p>
+          </p:txBody>
+        </p:sp>
+        <p:sp>
+          <p:nvSpPr>
+            <p:cNvPr id="51" name="Oval 50">
+              <a:extLst>
+                <a:ext uri="{FF2B5EF4-FFF2-40B4-BE49-F238E27FC236}">
+                  <a16:creationId xmlns:a16="http://schemas.microsoft.com/office/drawing/2014/main" id="{488A40C9-3C11-477D-B0FB-19648893F367}"/>
+                </a:ext>
+              </a:extLst>
+            </p:cNvPr>
+            <p:cNvSpPr/>
+            <p:nvPr/>
+          </p:nvSpPr>
+          <p:spPr>
+            <a:xfrm>
+              <a:off x="8336191" y="624781"/>
+              <a:ext cx="133350" cy="133350"/>
+            </a:xfrm>
+            <a:prstGeom prst="ellipse">
+              <a:avLst/>
+            </a:prstGeom>
+          </p:spPr>
+          <p:style>
+            <a:lnRef idx="2">
+              <a:schemeClr val="accent6"/>
+            </a:lnRef>
+            <a:fillRef idx="1">
+              <a:schemeClr val="lt1"/>
+            </a:fillRef>
+            <a:effectRef idx="0">
+              <a:schemeClr val="accent6"/>
+            </a:effectRef>
+            <a:fontRef idx="minor">
+              <a:schemeClr val="dk1"/>
+            </a:fontRef>
+          </p:style>
+          <p:txBody>
+            <a:bodyPr rtlCol="0" anchor="ctr"/>
+            <a:lstStyle/>
+            <a:p>
+              <a:pPr algn="ctr"/>
+              <a:endParaRPr lang="en-US" i="1" dirty="0"/>
+            </a:p>
+          </p:txBody>
+        </p:sp>
+      </p:grpSp>
+      <p:cxnSp>
+        <p:nvCxnSpPr>
+          <p:cNvPr id="22" name="Straight Connector 21">
+            <a:extLst>
+              <a:ext uri="{FF2B5EF4-FFF2-40B4-BE49-F238E27FC236}">
+                <a16:creationId xmlns:a16="http://schemas.microsoft.com/office/drawing/2014/main" id="{0C1DE094-A515-4C46-95B0-ED7004F98E9A}"/>
+              </a:ext>
+            </a:extLst>
+          </p:cNvPr>
+          <p:cNvCxnSpPr>
+            <a:cxnSpLocks/>
+          </p:cNvCxnSpPr>
+          <p:nvPr/>
+        </p:nvCxnSpPr>
+        <p:spPr>
+          <a:xfrm>
+            <a:off x="2765717" y="1606393"/>
+            <a:ext cx="706810" cy="0"/>
+          </a:xfrm>
+          <a:prstGeom prst="line">
+            <a:avLst/>
+          </a:prstGeom>
+          <a:ln cap="rnd">
+            <a:solidFill>
+              <a:schemeClr val="accent5"/>
+            </a:solidFill>
+          </a:ln>
+        </p:spPr>
+        <p:style>
+          <a:lnRef idx="3">
+            <a:schemeClr val="accent6"/>
+          </a:lnRef>
+          <a:fillRef idx="0">
+            <a:schemeClr val="accent6"/>
+          </a:fillRef>
+          <a:effectRef idx="2">
+            <a:schemeClr val="accent6"/>
+          </a:effectRef>
+          <a:fontRef idx="minor">
+            <a:schemeClr val="tx1"/>
+          </a:fontRef>
+        </p:style>
+      </p:cxnSp>
+      <p:cxnSp>
+        <p:nvCxnSpPr>
+          <p:cNvPr id="23" name="Straight Connector 22">
+            <a:extLst>
+              <a:ext uri="{FF2B5EF4-FFF2-40B4-BE49-F238E27FC236}">
+                <a16:creationId xmlns:a16="http://schemas.microsoft.com/office/drawing/2014/main" id="{996CF4D9-C92A-4504-8025-24E295B0798C}"/>
+              </a:ext>
+            </a:extLst>
+          </p:cNvPr>
+          <p:cNvCxnSpPr>
+            <a:cxnSpLocks/>
+          </p:cNvCxnSpPr>
+          <p:nvPr/>
+        </p:nvCxnSpPr>
+        <p:spPr>
+          <a:xfrm>
+            <a:off x="3472527" y="2179321"/>
+            <a:ext cx="0" cy="3551178"/>
+          </a:xfrm>
+          <a:prstGeom prst="line">
+            <a:avLst/>
+          </a:prstGeom>
+          <a:ln cap="rnd">
+            <a:solidFill>
+              <a:schemeClr val="accent5"/>
+            </a:solidFill>
+          </a:ln>
+        </p:spPr>
+        <p:style>
+          <a:lnRef idx="3">
+            <a:schemeClr val="accent6"/>
+          </a:lnRef>
+          <a:fillRef idx="0">
+            <a:schemeClr val="accent6"/>
+          </a:fillRef>
+          <a:effectRef idx="2">
+            <a:schemeClr val="accent6"/>
+          </a:effectRef>
+          <a:fontRef idx="minor">
+            <a:schemeClr val="tx1"/>
+          </a:fontRef>
+        </p:style>
+      </p:cxnSp>
+      <p:sp>
+        <p:nvSpPr>
+          <p:cNvPr id="24" name="TextBox 23">
+            <a:extLst>
+              <a:ext uri="{FF2B5EF4-FFF2-40B4-BE49-F238E27FC236}">
+                <a16:creationId xmlns:a16="http://schemas.microsoft.com/office/drawing/2014/main" id="{91C325EE-7B76-4AF0-ADAA-B018B8378985}"/>
+              </a:ext>
+            </a:extLst>
+          </p:cNvPr>
+          <p:cNvSpPr txBox="1"/>
+          <p:nvPr/>
+        </p:nvSpPr>
+        <p:spPr>
+          <a:xfrm>
+            <a:off x="2765717" y="1273647"/>
+            <a:ext cx="785664" cy="369332"/>
+          </a:xfrm>
+          <a:prstGeom prst="rect">
+            <a:avLst/>
+          </a:prstGeom>
+          <a:noFill/>
+        </p:spPr>
+        <p:txBody>
+          <a:bodyPr wrap="none" rtlCol="0">
+            <a:spAutoFit/>
+          </a:bodyPr>
+          <a:lstStyle/>
+          <a:p>
+            <a:r>
+              <a:rPr lang="en-US" dirty="0">
+                <a:solidFill>
+                  <a:schemeClr val="accent5">
+                    <a:lumMod val="75000"/>
+                  </a:schemeClr>
+                </a:solidFill>
+              </a:rPr>
+              <a:t>Server</a:t>
+            </a:r>
+          </a:p>
+        </p:txBody>
+      </p:sp>
+      <p:cxnSp>
+        <p:nvCxnSpPr>
+          <p:cNvPr id="27" name="Straight Connector 26">
+            <a:extLst>
+              <a:ext uri="{FF2B5EF4-FFF2-40B4-BE49-F238E27FC236}">
+                <a16:creationId xmlns:a16="http://schemas.microsoft.com/office/drawing/2014/main" id="{AE6660A0-DC72-4F69-99A9-01A13472EC2C}"/>
+              </a:ext>
+            </a:extLst>
+          </p:cNvPr>
+          <p:cNvCxnSpPr>
+            <a:cxnSpLocks/>
+          </p:cNvCxnSpPr>
+          <p:nvPr/>
+        </p:nvCxnSpPr>
+        <p:spPr>
+          <a:xfrm>
+            <a:off x="8896182" y="1986103"/>
+            <a:ext cx="1594494" cy="0"/>
+          </a:xfrm>
+          <a:prstGeom prst="line">
+            <a:avLst/>
+          </a:prstGeom>
+          <a:ln cap="rnd"/>
+        </p:spPr>
+        <p:style>
+          <a:lnRef idx="3">
+            <a:schemeClr val="accent6"/>
+          </a:lnRef>
+          <a:fillRef idx="0">
+            <a:schemeClr val="accent6"/>
+          </a:fillRef>
+          <a:effectRef idx="2">
+            <a:schemeClr val="accent6"/>
+          </a:effectRef>
+          <a:fontRef idx="minor">
+            <a:schemeClr val="tx1"/>
+          </a:fontRef>
+        </p:style>
+      </p:cxnSp>
+      <p:cxnSp>
+        <p:nvCxnSpPr>
+          <p:cNvPr id="28" name="Straight Connector 27">
+            <a:extLst>
+              <a:ext uri="{FF2B5EF4-FFF2-40B4-BE49-F238E27FC236}">
+                <a16:creationId xmlns:a16="http://schemas.microsoft.com/office/drawing/2014/main" id="{7368E408-A0B5-4E9E-8180-043CAF091D1B}"/>
+              </a:ext>
+            </a:extLst>
+          </p:cNvPr>
+          <p:cNvCxnSpPr>
+            <a:cxnSpLocks/>
+          </p:cNvCxnSpPr>
+          <p:nvPr/>
+        </p:nvCxnSpPr>
+        <p:spPr>
+          <a:xfrm>
+            <a:off x="8896182" y="1986103"/>
+            <a:ext cx="0" cy="4124106"/>
+          </a:xfrm>
+          <a:prstGeom prst="line">
+            <a:avLst/>
+          </a:prstGeom>
+          <a:ln cap="rnd"/>
+        </p:spPr>
+        <p:style>
+          <a:lnRef idx="3">
+            <a:schemeClr val="accent6"/>
+          </a:lnRef>
+          <a:fillRef idx="0">
+            <a:schemeClr val="accent6"/>
+          </a:fillRef>
+          <a:effectRef idx="2">
+            <a:schemeClr val="accent6"/>
+          </a:effectRef>
+          <a:fontRef idx="minor">
+            <a:schemeClr val="tx1"/>
+          </a:fontRef>
+        </p:style>
+      </p:cxnSp>
+      <p:sp>
+        <p:nvSpPr>
+          <p:cNvPr id="29" name="TextBox 28">
+            <a:extLst>
+              <a:ext uri="{FF2B5EF4-FFF2-40B4-BE49-F238E27FC236}">
+                <a16:creationId xmlns:a16="http://schemas.microsoft.com/office/drawing/2014/main" id="{8D4BFC4D-3BFF-45F4-AAE6-000F0223677D}"/>
+              </a:ext>
+            </a:extLst>
+          </p:cNvPr>
+          <p:cNvSpPr txBox="1"/>
+          <p:nvPr/>
+        </p:nvSpPr>
+        <p:spPr>
+          <a:xfrm>
+            <a:off x="8896181" y="1675842"/>
+            <a:ext cx="955454" cy="369332"/>
+          </a:xfrm>
+          <a:prstGeom prst="rect">
+            <a:avLst/>
+          </a:prstGeom>
+          <a:noFill/>
+        </p:spPr>
+        <p:txBody>
+          <a:bodyPr wrap="none" rtlCol="0">
+            <a:spAutoFit/>
+          </a:bodyPr>
+          <a:lstStyle/>
+          <a:p>
+            <a:r>
+              <a:rPr lang="en-US" dirty="0">
+                <a:solidFill>
+                  <a:schemeClr val="accent6">
+                    <a:lumMod val="75000"/>
+                  </a:schemeClr>
+                </a:solidFill>
+              </a:rPr>
+              <a:t>Browser</a:t>
+            </a:r>
+          </a:p>
+        </p:txBody>
+      </p:sp>
+      <p:cxnSp>
+        <p:nvCxnSpPr>
+          <p:cNvPr id="31" name="Straight Connector 30">
+            <a:extLst>
+              <a:ext uri="{FF2B5EF4-FFF2-40B4-BE49-F238E27FC236}">
+                <a16:creationId xmlns:a16="http://schemas.microsoft.com/office/drawing/2014/main" id="{65E0242A-BBB6-4022-8718-E643E18A7F1A}"/>
+              </a:ext>
+            </a:extLst>
+          </p:cNvPr>
+          <p:cNvCxnSpPr>
+            <a:cxnSpLocks/>
+          </p:cNvCxnSpPr>
+          <p:nvPr/>
+        </p:nvCxnSpPr>
+        <p:spPr>
+          <a:xfrm flipH="1">
+            <a:off x="3472529" y="1606393"/>
+            <a:ext cx="1" cy="508308"/>
+          </a:xfrm>
+          <a:prstGeom prst="line">
+            <a:avLst/>
+          </a:prstGeom>
+          <a:ln cap="rnd">
+            <a:solidFill>
+              <a:schemeClr val="accent5"/>
+            </a:solidFill>
+          </a:ln>
+        </p:spPr>
+        <p:style>
+          <a:lnRef idx="3">
+            <a:schemeClr val="accent6"/>
+          </a:lnRef>
+          <a:fillRef idx="0">
+            <a:schemeClr val="accent6"/>
+          </a:fillRef>
+          <a:effectRef idx="2">
+            <a:schemeClr val="accent6"/>
+          </a:effectRef>
+          <a:fontRef idx="minor">
+            <a:schemeClr val="tx1"/>
+          </a:fontRef>
+        </p:style>
+      </p:cxnSp>
+      <p:grpSp>
+        <p:nvGrpSpPr>
+          <p:cNvPr id="19" name="Group 18">
+            <a:extLst>
+              <a:ext uri="{FF2B5EF4-FFF2-40B4-BE49-F238E27FC236}">
+                <a16:creationId xmlns:a16="http://schemas.microsoft.com/office/drawing/2014/main" id="{A78D0F42-3CAD-4FA2-9EC0-A26F5D10A012}"/>
+              </a:ext>
+            </a:extLst>
+          </p:cNvPr>
+          <p:cNvGrpSpPr/>
+          <p:nvPr/>
+        </p:nvGrpSpPr>
+        <p:grpSpPr>
+          <a:xfrm>
+            <a:off x="3348646" y="2091220"/>
+            <a:ext cx="246382" cy="98340"/>
+            <a:chOff x="3348646" y="1458211"/>
+            <a:chExt cx="246382" cy="98340"/>
+          </a:xfrm>
+        </p:grpSpPr>
+        <p:grpSp>
+          <p:nvGrpSpPr>
+            <p:cNvPr id="18" name="Group 17">
+              <a:extLst>
+                <a:ext uri="{FF2B5EF4-FFF2-40B4-BE49-F238E27FC236}">
+                  <a16:creationId xmlns:a16="http://schemas.microsoft.com/office/drawing/2014/main" id="{04525F03-8565-4498-9563-E821697E02A3}"/>
+                </a:ext>
+              </a:extLst>
+            </p:cNvPr>
+            <p:cNvGrpSpPr/>
+            <p:nvPr/>
+          </p:nvGrpSpPr>
+          <p:grpSpPr>
+            <a:xfrm>
+              <a:off x="3350025" y="1458211"/>
+              <a:ext cx="245003" cy="47936"/>
+              <a:chOff x="3295819" y="1481939"/>
+              <a:chExt cx="245003" cy="47936"/>
+            </a:xfrm>
+          </p:grpSpPr>
+          <p:cxnSp>
+            <p:nvCxnSpPr>
+              <p:cNvPr id="36" name="Straight Connector 35">
+                <a:extLst>
+                  <a:ext uri="{FF2B5EF4-FFF2-40B4-BE49-F238E27FC236}">
+                    <a16:creationId xmlns:a16="http://schemas.microsoft.com/office/drawing/2014/main" id="{5EAB472E-F78C-4A58-A357-0FD9FC292026}"/>
+                  </a:ext>
+                </a:extLst>
+              </p:cNvPr>
+              <p:cNvCxnSpPr>
+                <a:cxnSpLocks/>
+              </p:cNvCxnSpPr>
+              <p:nvPr/>
+            </p:nvCxnSpPr>
+            <p:spPr>
+              <a:xfrm flipH="1">
+                <a:off x="3295819" y="1481939"/>
+                <a:ext cx="101316" cy="46963"/>
+              </a:xfrm>
+              <a:prstGeom prst="line">
+                <a:avLst/>
+              </a:prstGeom>
+              <a:ln cap="rnd">
+                <a:solidFill>
+                  <a:schemeClr val="accent5"/>
+                </a:solidFill>
+              </a:ln>
+            </p:spPr>
+            <p:style>
+              <a:lnRef idx="3">
+                <a:schemeClr val="accent6"/>
+              </a:lnRef>
+              <a:fillRef idx="0">
+                <a:schemeClr val="accent6"/>
+              </a:fillRef>
+              <a:effectRef idx="2">
+                <a:schemeClr val="accent6"/>
+              </a:effectRef>
+              <a:fontRef idx="minor">
+                <a:schemeClr val="tx1"/>
+              </a:fontRef>
+            </p:style>
+          </p:cxnSp>
+          <p:cxnSp>
+            <p:nvCxnSpPr>
+              <p:cNvPr id="39" name="Straight Connector 38">
+                <a:extLst>
+                  <a:ext uri="{FF2B5EF4-FFF2-40B4-BE49-F238E27FC236}">
+                    <a16:creationId xmlns:a16="http://schemas.microsoft.com/office/drawing/2014/main" id="{26086C09-E0D1-446E-8EC9-6D6E0B8AA457}"/>
+                  </a:ext>
+                </a:extLst>
+              </p:cNvPr>
+              <p:cNvCxnSpPr>
+                <a:cxnSpLocks/>
+              </p:cNvCxnSpPr>
+              <p:nvPr/>
+            </p:nvCxnSpPr>
+            <p:spPr>
+              <a:xfrm flipH="1" flipV="1">
+                <a:off x="3397135" y="1481939"/>
+                <a:ext cx="39614" cy="46963"/>
+              </a:xfrm>
+              <a:prstGeom prst="line">
+                <a:avLst/>
+              </a:prstGeom>
+              <a:ln cap="rnd">
+                <a:solidFill>
+                  <a:schemeClr val="accent5"/>
+                </a:solidFill>
+              </a:ln>
+            </p:spPr>
+            <p:style>
+              <a:lnRef idx="3">
+                <a:schemeClr val="accent6"/>
+              </a:lnRef>
+              <a:fillRef idx="0">
+                <a:schemeClr val="accent6"/>
+              </a:fillRef>
+              <a:effectRef idx="2">
+                <a:schemeClr val="accent6"/>
+              </a:effectRef>
+              <a:fontRef idx="minor">
+                <a:schemeClr val="tx1"/>
+              </a:fontRef>
+            </p:style>
+          </p:cxnSp>
+          <p:cxnSp>
+            <p:nvCxnSpPr>
+              <p:cNvPr id="42" name="Straight Connector 41">
+                <a:extLst>
+                  <a:ext uri="{FF2B5EF4-FFF2-40B4-BE49-F238E27FC236}">
+                    <a16:creationId xmlns:a16="http://schemas.microsoft.com/office/drawing/2014/main" id="{16CE63D4-E9B1-486D-A13E-4B29A108F77F}"/>
+                  </a:ext>
+                </a:extLst>
+              </p:cNvPr>
+              <p:cNvCxnSpPr>
+                <a:cxnSpLocks/>
+              </p:cNvCxnSpPr>
+              <p:nvPr/>
+            </p:nvCxnSpPr>
+            <p:spPr>
+              <a:xfrm flipH="1">
+                <a:off x="3439506" y="1482912"/>
+                <a:ext cx="101316" cy="46963"/>
+              </a:xfrm>
+              <a:prstGeom prst="line">
+                <a:avLst/>
+              </a:prstGeom>
+              <a:ln cap="rnd">
+                <a:solidFill>
+                  <a:schemeClr val="accent5"/>
+                </a:solidFill>
+              </a:ln>
+            </p:spPr>
+            <p:style>
+              <a:lnRef idx="3">
+                <a:schemeClr val="accent6"/>
+              </a:lnRef>
+              <a:fillRef idx="0">
+                <a:schemeClr val="accent6"/>
+              </a:fillRef>
+              <a:effectRef idx="2">
+                <a:schemeClr val="accent6"/>
+              </a:effectRef>
+              <a:fontRef idx="minor">
+                <a:schemeClr val="tx1"/>
+              </a:fontRef>
+            </p:style>
+          </p:cxnSp>
+        </p:grpSp>
+        <p:grpSp>
+          <p:nvGrpSpPr>
+            <p:cNvPr id="44" name="Group 43">
+              <a:extLst>
+                <a:ext uri="{FF2B5EF4-FFF2-40B4-BE49-F238E27FC236}">
+                  <a16:creationId xmlns:a16="http://schemas.microsoft.com/office/drawing/2014/main" id="{71C44889-CFD7-4905-8D9F-A01CE4C3E2CE}"/>
+                </a:ext>
+              </a:extLst>
+            </p:cNvPr>
+            <p:cNvGrpSpPr/>
+            <p:nvPr/>
+          </p:nvGrpSpPr>
+          <p:grpSpPr>
+            <a:xfrm>
+              <a:off x="3348646" y="1508615"/>
+              <a:ext cx="245003" cy="47936"/>
+              <a:chOff x="3295819" y="1481939"/>
+              <a:chExt cx="245003" cy="47936"/>
+            </a:xfrm>
+          </p:grpSpPr>
+          <p:cxnSp>
+            <p:nvCxnSpPr>
+              <p:cNvPr id="45" name="Straight Connector 44">
+                <a:extLst>
+                  <a:ext uri="{FF2B5EF4-FFF2-40B4-BE49-F238E27FC236}">
+                    <a16:creationId xmlns:a16="http://schemas.microsoft.com/office/drawing/2014/main" id="{4A1E22AE-C9E6-4BA4-9540-6EF0A12B603A}"/>
+                  </a:ext>
+                </a:extLst>
+              </p:cNvPr>
+              <p:cNvCxnSpPr>
+                <a:cxnSpLocks/>
+              </p:cNvCxnSpPr>
+              <p:nvPr/>
+            </p:nvCxnSpPr>
+            <p:spPr>
+              <a:xfrm flipH="1">
+                <a:off x="3295819" y="1481939"/>
+                <a:ext cx="101316" cy="46963"/>
+              </a:xfrm>
+              <a:prstGeom prst="line">
+                <a:avLst/>
+              </a:prstGeom>
+              <a:ln cap="rnd">
+                <a:solidFill>
+                  <a:schemeClr val="accent5"/>
+                </a:solidFill>
+              </a:ln>
+            </p:spPr>
+            <p:style>
+              <a:lnRef idx="3">
+                <a:schemeClr val="accent6"/>
+              </a:lnRef>
+              <a:fillRef idx="0">
+                <a:schemeClr val="accent6"/>
+              </a:fillRef>
+              <a:effectRef idx="2">
+                <a:schemeClr val="accent6"/>
+              </a:effectRef>
+              <a:fontRef idx="minor">
+                <a:schemeClr val="tx1"/>
+              </a:fontRef>
+            </p:style>
+          </p:cxnSp>
+          <p:cxnSp>
+            <p:nvCxnSpPr>
+              <p:cNvPr id="48" name="Straight Connector 47">
+                <a:extLst>
+                  <a:ext uri="{FF2B5EF4-FFF2-40B4-BE49-F238E27FC236}">
+                    <a16:creationId xmlns:a16="http://schemas.microsoft.com/office/drawing/2014/main" id="{AD8D6B39-B9FD-4E12-96E8-3B5F1E6774FB}"/>
+                  </a:ext>
+                </a:extLst>
+              </p:cNvPr>
+              <p:cNvCxnSpPr>
+                <a:cxnSpLocks/>
+              </p:cNvCxnSpPr>
+              <p:nvPr/>
+            </p:nvCxnSpPr>
+            <p:spPr>
+              <a:xfrm flipH="1" flipV="1">
+                <a:off x="3397135" y="1481939"/>
+                <a:ext cx="39614" cy="46963"/>
+              </a:xfrm>
+              <a:prstGeom prst="line">
+                <a:avLst/>
+              </a:prstGeom>
+              <a:ln cap="rnd">
+                <a:solidFill>
+                  <a:schemeClr val="accent5"/>
+                </a:solidFill>
+              </a:ln>
+            </p:spPr>
+            <p:style>
+              <a:lnRef idx="3">
+                <a:schemeClr val="accent6"/>
+              </a:lnRef>
+              <a:fillRef idx="0">
+                <a:schemeClr val="accent6"/>
+              </a:fillRef>
+              <a:effectRef idx="2">
+                <a:schemeClr val="accent6"/>
+              </a:effectRef>
+              <a:fontRef idx="minor">
+                <a:schemeClr val="tx1"/>
+              </a:fontRef>
+            </p:style>
+          </p:cxnSp>
+          <p:cxnSp>
+            <p:nvCxnSpPr>
+              <p:cNvPr id="52" name="Straight Connector 51">
+                <a:extLst>
+                  <a:ext uri="{FF2B5EF4-FFF2-40B4-BE49-F238E27FC236}">
+                    <a16:creationId xmlns:a16="http://schemas.microsoft.com/office/drawing/2014/main" id="{1237960F-66B9-4B03-B9BE-47D96937FFFB}"/>
+                  </a:ext>
+                </a:extLst>
+              </p:cNvPr>
+              <p:cNvCxnSpPr>
+                <a:cxnSpLocks/>
+              </p:cNvCxnSpPr>
+              <p:nvPr/>
+            </p:nvCxnSpPr>
+            <p:spPr>
+              <a:xfrm flipH="1">
+                <a:off x="3439506" y="1482912"/>
+                <a:ext cx="101316" cy="46963"/>
+              </a:xfrm>
+              <a:prstGeom prst="line">
+                <a:avLst/>
+              </a:prstGeom>
+              <a:ln cap="rnd">
+                <a:solidFill>
+                  <a:schemeClr val="accent5"/>
+                </a:solidFill>
+              </a:ln>
+            </p:spPr>
+            <p:style>
+              <a:lnRef idx="3">
+                <a:schemeClr val="accent6"/>
+              </a:lnRef>
+              <a:fillRef idx="0">
+                <a:schemeClr val="accent6"/>
+              </a:fillRef>
+              <a:effectRef idx="2">
+                <a:schemeClr val="accent6"/>
+              </a:effectRef>
+              <a:fontRef idx="minor">
+                <a:schemeClr val="tx1"/>
+              </a:fontRef>
+            </p:style>
+          </p:cxnSp>
+        </p:grpSp>
+      </p:grpSp>
+      <p:sp>
+        <p:nvSpPr>
+          <p:cNvPr id="55" name="Oval 54">
+            <a:extLst>
+              <a:ext uri="{FF2B5EF4-FFF2-40B4-BE49-F238E27FC236}">
+                <a16:creationId xmlns:a16="http://schemas.microsoft.com/office/drawing/2014/main" id="{9759FBA2-EC4A-4E24-9FDE-523D51A4910A}"/>
+              </a:ext>
+            </a:extLst>
+          </p:cNvPr>
+          <p:cNvSpPr/>
+          <p:nvPr/>
+        </p:nvSpPr>
+        <p:spPr>
+          <a:xfrm>
+            <a:off x="3404755" y="1706091"/>
+            <a:ext cx="133350" cy="133350"/>
+          </a:xfrm>
+          <a:prstGeom prst="ellipse">
+            <a:avLst/>
+          </a:prstGeom>
+          <a:ln>
+            <a:solidFill>
+              <a:schemeClr val="accent5"/>
+            </a:solidFill>
+          </a:ln>
+        </p:spPr>
+        <p:style>
+          <a:lnRef idx="2">
+            <a:schemeClr val="accent6"/>
+          </a:lnRef>
+          <a:fillRef idx="1">
+            <a:schemeClr val="lt1"/>
+          </a:fillRef>
+          <a:effectRef idx="0">
+            <a:schemeClr val="accent6"/>
+          </a:effectRef>
+          <a:fontRef idx="minor">
+            <a:schemeClr val="dk1"/>
+          </a:fontRef>
+        </p:style>
+        <p:txBody>
+          <a:bodyPr rtlCol="0" anchor="ctr"/>
+          <a:lstStyle/>
+          <a:p>
+            <a:pPr algn="ctr"/>
+            <a:endParaRPr lang="en-US" dirty="0"/>
+          </a:p>
+        </p:txBody>
+      </p:sp>
+      <p:sp>
+        <p:nvSpPr>
+          <p:cNvPr id="62" name="TextBox 61">
+            <a:extLst>
+              <a:ext uri="{FF2B5EF4-FFF2-40B4-BE49-F238E27FC236}">
+                <a16:creationId xmlns:a16="http://schemas.microsoft.com/office/drawing/2014/main" id="{BAABE3D2-F21F-4848-91A1-0198FA9C6B05}"/>
+              </a:ext>
+            </a:extLst>
+          </p:cNvPr>
+          <p:cNvSpPr txBox="1"/>
+          <p:nvPr/>
+        </p:nvSpPr>
+        <p:spPr>
+          <a:xfrm>
+            <a:off x="1884888" y="1640696"/>
+            <a:ext cx="1575047" cy="276999"/>
+          </a:xfrm>
+          <a:prstGeom prst="rect">
+            <a:avLst/>
+          </a:prstGeom>
+          <a:noFill/>
+        </p:spPr>
+        <p:txBody>
+          <a:bodyPr wrap="none" rtlCol="0">
+            <a:spAutoFit/>
+          </a:bodyPr>
+          <a:lstStyle/>
+          <a:p>
+            <a:r>
+              <a:rPr lang="en-US" sz="1200" dirty="0"/>
+              <a:t>Server Opens a Socket</a:t>
+            </a:r>
+          </a:p>
+        </p:txBody>
+      </p:sp>
+      <p:sp>
+        <p:nvSpPr>
+          <p:cNvPr id="25" name="TextBox 24">
+            <a:extLst>
+              <a:ext uri="{FF2B5EF4-FFF2-40B4-BE49-F238E27FC236}">
+                <a16:creationId xmlns:a16="http://schemas.microsoft.com/office/drawing/2014/main" id="{35B4A46F-ADA6-45C5-84B9-B791093844BB}"/>
+              </a:ext>
+            </a:extLst>
+          </p:cNvPr>
+          <p:cNvSpPr txBox="1"/>
+          <p:nvPr/>
+        </p:nvSpPr>
+        <p:spPr>
+          <a:xfrm>
+            <a:off x="1385203" y="1998030"/>
+            <a:ext cx="2043573" cy="276999"/>
+          </a:xfrm>
+          <a:prstGeom prst="rect">
+            <a:avLst/>
+          </a:prstGeom>
+          <a:noFill/>
+        </p:spPr>
+        <p:txBody>
+          <a:bodyPr wrap="none" rtlCol="0">
+            <a:spAutoFit/>
+          </a:bodyPr>
+          <a:lstStyle/>
+          <a:p>
+            <a:r>
+              <a:rPr lang="en-US" sz="1200" dirty="0"/>
+              <a:t>Server Waits for a Connection</a:t>
+            </a:r>
+          </a:p>
+        </p:txBody>
+      </p:sp>
+      <p:cxnSp>
+        <p:nvCxnSpPr>
+          <p:cNvPr id="66" name="Straight Arrow Connector 65">
+            <a:extLst>
+              <a:ext uri="{FF2B5EF4-FFF2-40B4-BE49-F238E27FC236}">
+                <a16:creationId xmlns:a16="http://schemas.microsoft.com/office/drawing/2014/main" id="{B2405AD0-0557-4EEC-86BB-A843346752EF}"/>
+              </a:ext>
+            </a:extLst>
+          </p:cNvPr>
+          <p:cNvCxnSpPr/>
+          <p:nvPr/>
+        </p:nvCxnSpPr>
+        <p:spPr>
+          <a:xfrm flipH="1">
+            <a:off x="3467356" y="2121501"/>
+            <a:ext cx="5427446" cy="632989"/>
+          </a:xfrm>
+          <a:prstGeom prst="straightConnector1">
+            <a:avLst/>
+          </a:prstGeom>
+          <a:ln w="19050">
+            <a:solidFill>
+              <a:schemeClr val="accent6">
+                <a:lumMod val="75000"/>
+              </a:schemeClr>
+            </a:solidFill>
+            <a:tailEnd type="triangle"/>
+          </a:ln>
+        </p:spPr>
+        <p:style>
+          <a:lnRef idx="1">
+            <a:schemeClr val="accent1"/>
+          </a:lnRef>
+          <a:fillRef idx="0">
+            <a:schemeClr val="accent1"/>
+          </a:fillRef>
+          <a:effectRef idx="0">
+            <a:schemeClr val="accent1"/>
+          </a:effectRef>
+          <a:fontRef idx="minor">
+            <a:schemeClr val="tx1"/>
+          </a:fontRef>
+        </p:style>
+      </p:cxnSp>
+      <p:sp>
+        <p:nvSpPr>
+          <p:cNvPr id="68" name="TextBox 67">
+            <a:extLst>
+              <a:ext uri="{FF2B5EF4-FFF2-40B4-BE49-F238E27FC236}">
+                <a16:creationId xmlns:a16="http://schemas.microsoft.com/office/drawing/2014/main" id="{062BC9D5-6789-4F3E-8FF0-A7373D7E8F4C}"/>
+              </a:ext>
+            </a:extLst>
+          </p:cNvPr>
+          <p:cNvSpPr txBox="1"/>
+          <p:nvPr/>
+        </p:nvSpPr>
+        <p:spPr>
+          <a:xfrm>
+            <a:off x="8847652" y="1995997"/>
+            <a:ext cx="1054391" cy="276999"/>
+          </a:xfrm>
+          <a:prstGeom prst="rect">
+            <a:avLst/>
+          </a:prstGeom>
+          <a:noFill/>
+        </p:spPr>
+        <p:txBody>
+          <a:bodyPr wrap="none" rtlCol="0">
+            <a:spAutoFit/>
+          </a:bodyPr>
+          <a:lstStyle/>
+          <a:p>
+            <a:r>
+              <a:rPr lang="en-US" sz="1200" dirty="0">
+                <a:solidFill>
+                  <a:schemeClr val="accent6">
+                    <a:lumMod val="75000"/>
+                  </a:schemeClr>
+                </a:solidFill>
+              </a:rPr>
+              <a:t>HTTP Request</a:t>
+            </a:r>
+          </a:p>
+        </p:txBody>
+      </p:sp>
+      <p:cxnSp>
+        <p:nvCxnSpPr>
+          <p:cNvPr id="69" name="Straight Arrow Connector 68">
+            <a:extLst>
+              <a:ext uri="{FF2B5EF4-FFF2-40B4-BE49-F238E27FC236}">
+                <a16:creationId xmlns:a16="http://schemas.microsoft.com/office/drawing/2014/main" id="{8ECEEC34-7521-44DC-AEE1-44BC930940A1}"/>
+              </a:ext>
+            </a:extLst>
+          </p:cNvPr>
+          <p:cNvCxnSpPr>
+            <a:cxnSpLocks/>
+          </p:cNvCxnSpPr>
+          <p:nvPr/>
+        </p:nvCxnSpPr>
+        <p:spPr>
+          <a:xfrm>
+            <a:off x="3489576" y="2890434"/>
+            <a:ext cx="5416337" cy="364210"/>
+          </a:xfrm>
+          <a:prstGeom prst="straightConnector1">
+            <a:avLst/>
+          </a:prstGeom>
+          <a:ln w="19050">
+            <a:solidFill>
+              <a:schemeClr val="accent5">
+                <a:lumMod val="75000"/>
+              </a:schemeClr>
+            </a:solidFill>
+            <a:tailEnd type="triangle"/>
+          </a:ln>
+        </p:spPr>
+        <p:style>
+          <a:lnRef idx="1">
+            <a:schemeClr val="accent1"/>
+          </a:lnRef>
+          <a:fillRef idx="0">
+            <a:schemeClr val="accent1"/>
+          </a:fillRef>
+          <a:effectRef idx="0">
+            <a:schemeClr val="accent1"/>
+          </a:effectRef>
+          <a:fontRef idx="minor">
+            <a:schemeClr val="tx1"/>
+          </a:fontRef>
+        </p:style>
+      </p:cxnSp>
+      <p:sp>
+        <p:nvSpPr>
+          <p:cNvPr id="74" name="TextBox 73">
+            <a:extLst>
+              <a:ext uri="{FF2B5EF4-FFF2-40B4-BE49-F238E27FC236}">
+                <a16:creationId xmlns:a16="http://schemas.microsoft.com/office/drawing/2014/main" id="{3A054D24-4BB3-4343-A04A-D6B572929929}"/>
+              </a:ext>
+            </a:extLst>
+          </p:cNvPr>
+          <p:cNvSpPr txBox="1"/>
+          <p:nvPr/>
+        </p:nvSpPr>
+        <p:spPr>
+          <a:xfrm>
+            <a:off x="2390611" y="2751934"/>
+            <a:ext cx="1147494" cy="276999"/>
+          </a:xfrm>
+          <a:prstGeom prst="rect">
+            <a:avLst/>
+          </a:prstGeom>
+          <a:noFill/>
+        </p:spPr>
+        <p:txBody>
+          <a:bodyPr wrap="none" rtlCol="0">
+            <a:spAutoFit/>
+          </a:bodyPr>
+          <a:lstStyle/>
+          <a:p>
+            <a:r>
+              <a:rPr lang="en-US" sz="1200" dirty="0">
+                <a:solidFill>
+                  <a:schemeClr val="accent5">
+                    <a:lumMod val="75000"/>
+                  </a:schemeClr>
+                </a:solidFill>
+              </a:rPr>
+              <a:t>HTTP Response</a:t>
+            </a:r>
+          </a:p>
+        </p:txBody>
+      </p:sp>
+      <p:sp>
+        <p:nvSpPr>
+          <p:cNvPr id="76" name="TextBox 75">
+            <a:extLst>
+              <a:ext uri="{FF2B5EF4-FFF2-40B4-BE49-F238E27FC236}">
+                <a16:creationId xmlns:a16="http://schemas.microsoft.com/office/drawing/2014/main" id="{68AE60C1-3ADF-4073-B129-F26CFF389C6A}"/>
+              </a:ext>
+            </a:extLst>
+          </p:cNvPr>
+          <p:cNvSpPr txBox="1"/>
+          <p:nvPr/>
+        </p:nvSpPr>
+        <p:spPr>
+          <a:xfrm>
+            <a:off x="8847652" y="3107439"/>
+            <a:ext cx="1612493" cy="276999"/>
+          </a:xfrm>
+          <a:prstGeom prst="rect">
+            <a:avLst/>
+          </a:prstGeom>
+          <a:noFill/>
+        </p:spPr>
+        <p:txBody>
+          <a:bodyPr wrap="none" rtlCol="0">
+            <a:spAutoFit/>
+          </a:bodyPr>
+          <a:lstStyle/>
+          <a:p>
+            <a:r>
+              <a:rPr lang="en-US" sz="1200" dirty="0"/>
+              <a:t>Client Parses Response</a:t>
+            </a:r>
+          </a:p>
+        </p:txBody>
+      </p:sp>
+      <p:sp>
+        <p:nvSpPr>
+          <p:cNvPr id="78" name="TextBox 77">
+            <a:extLst>
+              <a:ext uri="{FF2B5EF4-FFF2-40B4-BE49-F238E27FC236}">
+                <a16:creationId xmlns:a16="http://schemas.microsoft.com/office/drawing/2014/main" id="{81DC2592-9781-4173-9D7D-29254A9D7901}"/>
+              </a:ext>
+            </a:extLst>
+          </p:cNvPr>
+          <p:cNvSpPr txBox="1"/>
+          <p:nvPr/>
+        </p:nvSpPr>
+        <p:spPr>
+          <a:xfrm>
+            <a:off x="8903458" y="3466583"/>
+            <a:ext cx="2609328" cy="646331"/>
+          </a:xfrm>
+          <a:prstGeom prst="rect">
+            <a:avLst/>
+          </a:prstGeom>
+          <a:noFill/>
+        </p:spPr>
+        <p:txBody>
+          <a:bodyPr wrap="square" rtlCol="0">
+            <a:spAutoFit/>
+          </a:bodyPr>
+          <a:lstStyle/>
+          <a:p>
+            <a:r>
+              <a:rPr lang="en-US" sz="1200" dirty="0"/>
+              <a:t>Client requests additional resources based on the body of the response. These could be images, .</a:t>
+            </a:r>
+            <a:r>
+              <a:rPr lang="en-US" sz="1200" dirty="0" err="1"/>
+              <a:t>css</a:t>
+            </a:r>
+            <a:r>
+              <a:rPr lang="en-US" sz="1200" dirty="0"/>
+              <a:t>, or .</a:t>
+            </a:r>
+            <a:r>
+              <a:rPr lang="en-US" sz="1200" dirty="0" err="1"/>
+              <a:t>js</a:t>
+            </a:r>
+            <a:r>
+              <a:rPr lang="en-US" sz="1200" dirty="0"/>
+              <a:t> files. </a:t>
+            </a:r>
+          </a:p>
+        </p:txBody>
+      </p:sp>
+      <p:cxnSp>
+        <p:nvCxnSpPr>
+          <p:cNvPr id="79" name="Straight Arrow Connector 78">
+            <a:extLst>
+              <a:ext uri="{FF2B5EF4-FFF2-40B4-BE49-F238E27FC236}">
+                <a16:creationId xmlns:a16="http://schemas.microsoft.com/office/drawing/2014/main" id="{801A8E53-657B-4226-BE34-CE27FDF5CCB5}"/>
+              </a:ext>
+            </a:extLst>
+          </p:cNvPr>
+          <p:cNvCxnSpPr>
+            <a:cxnSpLocks/>
+          </p:cNvCxnSpPr>
+          <p:nvPr/>
+        </p:nvCxnSpPr>
+        <p:spPr>
+          <a:xfrm flipH="1">
+            <a:off x="3472527" y="3638415"/>
+            <a:ext cx="5427446" cy="632989"/>
+          </a:xfrm>
+          <a:prstGeom prst="straightConnector1">
+            <a:avLst/>
+          </a:prstGeom>
+          <a:ln w="19050">
+            <a:solidFill>
+              <a:schemeClr val="accent6">
+                <a:lumMod val="75000"/>
+              </a:schemeClr>
+            </a:solidFill>
+            <a:tailEnd type="triangle"/>
+          </a:ln>
+        </p:spPr>
+        <p:style>
+          <a:lnRef idx="1">
+            <a:schemeClr val="accent1"/>
+          </a:lnRef>
+          <a:fillRef idx="0">
+            <a:schemeClr val="accent1"/>
+          </a:fillRef>
+          <a:effectRef idx="0">
+            <a:schemeClr val="accent1"/>
+          </a:effectRef>
+          <a:fontRef idx="minor">
+            <a:schemeClr val="tx1"/>
+          </a:fontRef>
+        </p:style>
+      </p:cxnSp>
+      <p:cxnSp>
+        <p:nvCxnSpPr>
+          <p:cNvPr id="80" name="Straight Arrow Connector 79">
+            <a:extLst>
+              <a:ext uri="{FF2B5EF4-FFF2-40B4-BE49-F238E27FC236}">
+                <a16:creationId xmlns:a16="http://schemas.microsoft.com/office/drawing/2014/main" id="{BB78839B-4B2A-45F8-9BBA-2B9067B725A5}"/>
+              </a:ext>
+            </a:extLst>
+          </p:cNvPr>
+          <p:cNvCxnSpPr>
+            <a:cxnSpLocks/>
+          </p:cNvCxnSpPr>
+          <p:nvPr/>
+        </p:nvCxnSpPr>
+        <p:spPr>
+          <a:xfrm flipH="1">
+            <a:off x="3472527" y="3744427"/>
+            <a:ext cx="5427446" cy="632989"/>
+          </a:xfrm>
+          <a:prstGeom prst="straightConnector1">
+            <a:avLst/>
+          </a:prstGeom>
+          <a:ln w="19050">
+            <a:solidFill>
+              <a:schemeClr val="accent6">
+                <a:lumMod val="75000"/>
+              </a:schemeClr>
+            </a:solidFill>
+            <a:tailEnd type="triangle"/>
+          </a:ln>
+        </p:spPr>
+        <p:style>
+          <a:lnRef idx="1">
+            <a:schemeClr val="accent1"/>
+          </a:lnRef>
+          <a:fillRef idx="0">
+            <a:schemeClr val="accent1"/>
+          </a:fillRef>
+          <a:effectRef idx="0">
+            <a:schemeClr val="accent1"/>
+          </a:effectRef>
+          <a:fontRef idx="minor">
+            <a:schemeClr val="tx1"/>
+          </a:fontRef>
+        </p:style>
+      </p:cxnSp>
+      <p:cxnSp>
+        <p:nvCxnSpPr>
+          <p:cNvPr id="81" name="Straight Arrow Connector 80">
+            <a:extLst>
+              <a:ext uri="{FF2B5EF4-FFF2-40B4-BE49-F238E27FC236}">
+                <a16:creationId xmlns:a16="http://schemas.microsoft.com/office/drawing/2014/main" id="{6C7AFB02-22BE-4374-8CDC-9699EA90D6D5}"/>
+              </a:ext>
+            </a:extLst>
+          </p:cNvPr>
+          <p:cNvCxnSpPr>
+            <a:cxnSpLocks/>
+          </p:cNvCxnSpPr>
+          <p:nvPr/>
+        </p:nvCxnSpPr>
+        <p:spPr>
+          <a:xfrm flipH="1">
+            <a:off x="3472527" y="3850439"/>
+            <a:ext cx="5427446" cy="632989"/>
+          </a:xfrm>
+          <a:prstGeom prst="straightConnector1">
+            <a:avLst/>
+          </a:prstGeom>
+          <a:ln w="19050">
+            <a:solidFill>
+              <a:schemeClr val="accent6">
+                <a:lumMod val="75000"/>
+              </a:schemeClr>
+            </a:solidFill>
+            <a:tailEnd type="triangle"/>
+          </a:ln>
+        </p:spPr>
+        <p:style>
+          <a:lnRef idx="1">
+            <a:schemeClr val="accent1"/>
+          </a:lnRef>
+          <a:fillRef idx="0">
+            <a:schemeClr val="accent1"/>
+          </a:fillRef>
+          <a:effectRef idx="0">
+            <a:schemeClr val="accent1"/>
+          </a:effectRef>
+          <a:fontRef idx="minor">
+            <a:schemeClr val="tx1"/>
+          </a:fontRef>
+        </p:style>
+      </p:cxnSp>
+      <p:cxnSp>
+        <p:nvCxnSpPr>
+          <p:cNvPr id="82" name="Straight Arrow Connector 81">
+            <a:extLst>
+              <a:ext uri="{FF2B5EF4-FFF2-40B4-BE49-F238E27FC236}">
+                <a16:creationId xmlns:a16="http://schemas.microsoft.com/office/drawing/2014/main" id="{D85AE60C-F518-4259-A6F1-78C12CECD7B8}"/>
+              </a:ext>
+            </a:extLst>
+          </p:cNvPr>
+          <p:cNvCxnSpPr>
+            <a:cxnSpLocks/>
+          </p:cNvCxnSpPr>
+          <p:nvPr/>
+        </p:nvCxnSpPr>
+        <p:spPr>
+          <a:xfrm flipH="1">
+            <a:off x="3472527" y="3956451"/>
+            <a:ext cx="5427446" cy="632989"/>
+          </a:xfrm>
+          <a:prstGeom prst="straightConnector1">
+            <a:avLst/>
+          </a:prstGeom>
+          <a:ln w="19050">
+            <a:solidFill>
+              <a:schemeClr val="accent6">
+                <a:lumMod val="75000"/>
+              </a:schemeClr>
+            </a:solidFill>
+            <a:tailEnd type="triangle"/>
+          </a:ln>
+        </p:spPr>
+        <p:style>
+          <a:lnRef idx="1">
+            <a:schemeClr val="accent1"/>
+          </a:lnRef>
+          <a:fillRef idx="0">
+            <a:schemeClr val="accent1"/>
+          </a:fillRef>
+          <a:effectRef idx="0">
+            <a:schemeClr val="accent1"/>
+          </a:effectRef>
+          <a:fontRef idx="minor">
+            <a:schemeClr val="tx1"/>
+          </a:fontRef>
+        </p:style>
+      </p:cxnSp>
+      <p:cxnSp>
+        <p:nvCxnSpPr>
+          <p:cNvPr id="83" name="Straight Arrow Connector 82">
+            <a:extLst>
+              <a:ext uri="{FF2B5EF4-FFF2-40B4-BE49-F238E27FC236}">
+                <a16:creationId xmlns:a16="http://schemas.microsoft.com/office/drawing/2014/main" id="{26AB807A-C4C5-4E49-9F9F-07AFD723A86C}"/>
+              </a:ext>
+            </a:extLst>
+          </p:cNvPr>
+          <p:cNvCxnSpPr>
+            <a:cxnSpLocks/>
+          </p:cNvCxnSpPr>
+          <p:nvPr/>
+        </p:nvCxnSpPr>
+        <p:spPr>
+          <a:xfrm flipH="1">
+            <a:off x="3472527" y="4062463"/>
+            <a:ext cx="5427446" cy="632989"/>
+          </a:xfrm>
+          <a:prstGeom prst="straightConnector1">
+            <a:avLst/>
+          </a:prstGeom>
+          <a:ln w="19050">
+            <a:solidFill>
+              <a:schemeClr val="accent6">
+                <a:lumMod val="75000"/>
+              </a:schemeClr>
+            </a:solidFill>
+            <a:tailEnd type="triangle"/>
+          </a:ln>
+        </p:spPr>
+        <p:style>
+          <a:lnRef idx="1">
+            <a:schemeClr val="accent1"/>
+          </a:lnRef>
+          <a:fillRef idx="0">
+            <a:schemeClr val="accent1"/>
+          </a:fillRef>
+          <a:effectRef idx="0">
+            <a:schemeClr val="accent1"/>
+          </a:effectRef>
+          <a:fontRef idx="minor">
+            <a:schemeClr val="tx1"/>
+          </a:fontRef>
+        </p:style>
+      </p:cxnSp>
+      <p:cxnSp>
+        <p:nvCxnSpPr>
+          <p:cNvPr id="84" name="Straight Arrow Connector 83">
+            <a:extLst>
+              <a:ext uri="{FF2B5EF4-FFF2-40B4-BE49-F238E27FC236}">
+                <a16:creationId xmlns:a16="http://schemas.microsoft.com/office/drawing/2014/main" id="{C06B72B2-9EAF-434A-A5E5-B18DF08B6CE3}"/>
+              </a:ext>
+            </a:extLst>
+          </p:cNvPr>
+          <p:cNvCxnSpPr>
+            <a:cxnSpLocks/>
+          </p:cNvCxnSpPr>
+          <p:nvPr/>
+        </p:nvCxnSpPr>
+        <p:spPr>
+          <a:xfrm flipH="1">
+            <a:off x="3472527" y="4168473"/>
+            <a:ext cx="5427446" cy="632989"/>
+          </a:xfrm>
+          <a:prstGeom prst="straightConnector1">
+            <a:avLst/>
+          </a:prstGeom>
+          <a:ln w="19050">
+            <a:solidFill>
+              <a:schemeClr val="accent6">
+                <a:lumMod val="75000"/>
+              </a:schemeClr>
+            </a:solidFill>
+            <a:tailEnd type="triangle"/>
+          </a:ln>
+        </p:spPr>
+        <p:style>
+          <a:lnRef idx="1">
+            <a:schemeClr val="accent1"/>
+          </a:lnRef>
+          <a:fillRef idx="0">
+            <a:schemeClr val="accent1"/>
+          </a:fillRef>
+          <a:effectRef idx="0">
+            <a:schemeClr val="accent1"/>
+          </a:effectRef>
+          <a:fontRef idx="minor">
+            <a:schemeClr val="tx1"/>
+          </a:fontRef>
+        </p:style>
+      </p:cxnSp>
+      <p:sp>
+        <p:nvSpPr>
+          <p:cNvPr id="86" name="TextBox 85">
+            <a:extLst>
+              <a:ext uri="{FF2B5EF4-FFF2-40B4-BE49-F238E27FC236}">
+                <a16:creationId xmlns:a16="http://schemas.microsoft.com/office/drawing/2014/main" id="{F243C451-B9D5-4808-899B-33BD68D3B181}"/>
+              </a:ext>
+            </a:extLst>
+          </p:cNvPr>
+          <p:cNvSpPr txBox="1"/>
+          <p:nvPr/>
+        </p:nvSpPr>
+        <p:spPr>
+          <a:xfrm>
+            <a:off x="1674408" y="4169531"/>
+            <a:ext cx="1722727" cy="1015663"/>
+          </a:xfrm>
+          <a:prstGeom prst="rect">
+            <a:avLst/>
+          </a:prstGeom>
+          <a:noFill/>
+        </p:spPr>
+        <p:txBody>
+          <a:bodyPr wrap="square" rtlCol="0">
+            <a:spAutoFit/>
+          </a:bodyPr>
+          <a:lstStyle/>
+          <a:p>
+            <a:pPr algn="r"/>
+            <a:r>
+              <a:rPr lang="en-US" sz="1200" dirty="0"/>
+              <a:t>Server receives multiple requests almost simultaneously. This is where threading comes into play.</a:t>
+            </a:r>
+          </a:p>
+        </p:txBody>
+      </p:sp>
+      <p:cxnSp>
+        <p:nvCxnSpPr>
+          <p:cNvPr id="87" name="Straight Arrow Connector 86">
+            <a:extLst>
+              <a:ext uri="{FF2B5EF4-FFF2-40B4-BE49-F238E27FC236}">
+                <a16:creationId xmlns:a16="http://schemas.microsoft.com/office/drawing/2014/main" id="{62197940-0285-41F9-9181-1986D6C5A9CF}"/>
+              </a:ext>
+            </a:extLst>
+          </p:cNvPr>
+          <p:cNvCxnSpPr>
+            <a:cxnSpLocks/>
+          </p:cNvCxnSpPr>
+          <p:nvPr/>
+        </p:nvCxnSpPr>
+        <p:spPr>
+          <a:xfrm>
+            <a:off x="3483636" y="4331240"/>
+            <a:ext cx="5416337" cy="364210"/>
+          </a:xfrm>
+          <a:prstGeom prst="straightConnector1">
+            <a:avLst/>
+          </a:prstGeom>
+          <a:ln w="19050">
+            <a:solidFill>
+              <a:schemeClr val="accent5">
+                <a:lumMod val="75000"/>
+              </a:schemeClr>
+            </a:solidFill>
+            <a:tailEnd type="triangle"/>
+          </a:ln>
+        </p:spPr>
+        <p:style>
+          <a:lnRef idx="1">
+            <a:schemeClr val="accent1"/>
+          </a:lnRef>
+          <a:fillRef idx="0">
+            <a:schemeClr val="accent1"/>
+          </a:fillRef>
+          <a:effectRef idx="0">
+            <a:schemeClr val="accent1"/>
+          </a:effectRef>
+          <a:fontRef idx="minor">
+            <a:schemeClr val="tx1"/>
+          </a:fontRef>
+        </p:style>
+      </p:cxnSp>
+      <p:cxnSp>
+        <p:nvCxnSpPr>
+          <p:cNvPr id="88" name="Straight Arrow Connector 87">
+            <a:extLst>
+              <a:ext uri="{FF2B5EF4-FFF2-40B4-BE49-F238E27FC236}">
+                <a16:creationId xmlns:a16="http://schemas.microsoft.com/office/drawing/2014/main" id="{6A2E0F85-98E9-4BEE-86DA-D729BFEC301A}"/>
+              </a:ext>
+            </a:extLst>
+          </p:cNvPr>
+          <p:cNvCxnSpPr>
+            <a:cxnSpLocks/>
+          </p:cNvCxnSpPr>
+          <p:nvPr/>
+        </p:nvCxnSpPr>
+        <p:spPr>
+          <a:xfrm>
+            <a:off x="3483636" y="4441502"/>
+            <a:ext cx="5416337" cy="364210"/>
+          </a:xfrm>
+          <a:prstGeom prst="straightConnector1">
+            <a:avLst/>
+          </a:prstGeom>
+          <a:ln w="19050">
+            <a:solidFill>
+              <a:schemeClr val="accent5">
+                <a:lumMod val="75000"/>
+              </a:schemeClr>
+            </a:solidFill>
+            <a:tailEnd type="triangle"/>
+          </a:ln>
+        </p:spPr>
+        <p:style>
+          <a:lnRef idx="1">
+            <a:schemeClr val="accent1"/>
+          </a:lnRef>
+          <a:fillRef idx="0">
+            <a:schemeClr val="accent1"/>
+          </a:fillRef>
+          <a:effectRef idx="0">
+            <a:schemeClr val="accent1"/>
+          </a:effectRef>
+          <a:fontRef idx="minor">
+            <a:schemeClr val="tx1"/>
+          </a:fontRef>
+        </p:style>
+      </p:cxnSp>
+      <p:cxnSp>
+        <p:nvCxnSpPr>
+          <p:cNvPr id="89" name="Straight Arrow Connector 88">
+            <a:extLst>
+              <a:ext uri="{FF2B5EF4-FFF2-40B4-BE49-F238E27FC236}">
+                <a16:creationId xmlns:a16="http://schemas.microsoft.com/office/drawing/2014/main" id="{DA31F19B-D8A6-46E2-B9C9-8FBE8FAE82A9}"/>
+              </a:ext>
+            </a:extLst>
+          </p:cNvPr>
+          <p:cNvCxnSpPr>
+            <a:cxnSpLocks/>
+          </p:cNvCxnSpPr>
+          <p:nvPr/>
+        </p:nvCxnSpPr>
+        <p:spPr>
+          <a:xfrm>
+            <a:off x="3483636" y="4551764"/>
+            <a:ext cx="5416337" cy="364210"/>
+          </a:xfrm>
+          <a:prstGeom prst="straightConnector1">
+            <a:avLst/>
+          </a:prstGeom>
+          <a:ln w="19050">
+            <a:solidFill>
+              <a:schemeClr val="accent5">
+                <a:lumMod val="75000"/>
+              </a:schemeClr>
+            </a:solidFill>
+            <a:tailEnd type="triangle"/>
+          </a:ln>
+        </p:spPr>
+        <p:style>
+          <a:lnRef idx="1">
+            <a:schemeClr val="accent1"/>
+          </a:lnRef>
+          <a:fillRef idx="0">
+            <a:schemeClr val="accent1"/>
+          </a:fillRef>
+          <a:effectRef idx="0">
+            <a:schemeClr val="accent1"/>
+          </a:effectRef>
+          <a:fontRef idx="minor">
+            <a:schemeClr val="tx1"/>
+          </a:fontRef>
+        </p:style>
+      </p:cxnSp>
+      <p:cxnSp>
+        <p:nvCxnSpPr>
+          <p:cNvPr id="90" name="Straight Arrow Connector 89">
+            <a:extLst>
+              <a:ext uri="{FF2B5EF4-FFF2-40B4-BE49-F238E27FC236}">
+                <a16:creationId xmlns:a16="http://schemas.microsoft.com/office/drawing/2014/main" id="{C36B697B-E18C-4495-AF69-CACC55B4D154}"/>
+              </a:ext>
+            </a:extLst>
+          </p:cNvPr>
+          <p:cNvCxnSpPr>
+            <a:cxnSpLocks/>
+          </p:cNvCxnSpPr>
+          <p:nvPr/>
+        </p:nvCxnSpPr>
+        <p:spPr>
+          <a:xfrm>
+            <a:off x="3483636" y="4662026"/>
+            <a:ext cx="5416337" cy="364210"/>
+          </a:xfrm>
+          <a:prstGeom prst="straightConnector1">
+            <a:avLst/>
+          </a:prstGeom>
+          <a:ln w="19050">
+            <a:solidFill>
+              <a:schemeClr val="accent5">
+                <a:lumMod val="75000"/>
+              </a:schemeClr>
+            </a:solidFill>
+            <a:tailEnd type="triangle"/>
+          </a:ln>
+        </p:spPr>
+        <p:style>
+          <a:lnRef idx="1">
+            <a:schemeClr val="accent1"/>
+          </a:lnRef>
+          <a:fillRef idx="0">
+            <a:schemeClr val="accent1"/>
+          </a:fillRef>
+          <a:effectRef idx="0">
+            <a:schemeClr val="accent1"/>
+          </a:effectRef>
+          <a:fontRef idx="minor">
+            <a:schemeClr val="tx1"/>
+          </a:fontRef>
+        </p:style>
+      </p:cxnSp>
+      <p:cxnSp>
+        <p:nvCxnSpPr>
+          <p:cNvPr id="91" name="Straight Arrow Connector 90">
+            <a:extLst>
+              <a:ext uri="{FF2B5EF4-FFF2-40B4-BE49-F238E27FC236}">
+                <a16:creationId xmlns:a16="http://schemas.microsoft.com/office/drawing/2014/main" id="{89F6AC07-D463-410C-8C5E-664018D5CCE1}"/>
+              </a:ext>
+            </a:extLst>
+          </p:cNvPr>
+          <p:cNvCxnSpPr>
+            <a:cxnSpLocks/>
+          </p:cNvCxnSpPr>
+          <p:nvPr/>
+        </p:nvCxnSpPr>
+        <p:spPr>
+          <a:xfrm>
+            <a:off x="3483636" y="4772288"/>
+            <a:ext cx="5416337" cy="364210"/>
+          </a:xfrm>
+          <a:prstGeom prst="straightConnector1">
+            <a:avLst/>
+          </a:prstGeom>
+          <a:ln w="19050">
+            <a:solidFill>
+              <a:schemeClr val="accent5">
+                <a:lumMod val="75000"/>
+              </a:schemeClr>
+            </a:solidFill>
+            <a:tailEnd type="triangle"/>
+          </a:ln>
+        </p:spPr>
+        <p:style>
+          <a:lnRef idx="1">
+            <a:schemeClr val="accent1"/>
+          </a:lnRef>
+          <a:fillRef idx="0">
+            <a:schemeClr val="accent1"/>
+          </a:fillRef>
+          <a:effectRef idx="0">
+            <a:schemeClr val="accent1"/>
+          </a:effectRef>
+          <a:fontRef idx="minor">
+            <a:schemeClr val="tx1"/>
+          </a:fontRef>
+        </p:style>
+      </p:cxnSp>
+      <p:cxnSp>
+        <p:nvCxnSpPr>
+          <p:cNvPr id="92" name="Straight Arrow Connector 91">
+            <a:extLst>
+              <a:ext uri="{FF2B5EF4-FFF2-40B4-BE49-F238E27FC236}">
+                <a16:creationId xmlns:a16="http://schemas.microsoft.com/office/drawing/2014/main" id="{7A7F6F9A-C96B-4C61-A57C-524F4344529D}"/>
+              </a:ext>
+            </a:extLst>
+          </p:cNvPr>
+          <p:cNvCxnSpPr>
+            <a:cxnSpLocks/>
+          </p:cNvCxnSpPr>
+          <p:nvPr/>
+        </p:nvCxnSpPr>
+        <p:spPr>
+          <a:xfrm>
+            <a:off x="3483636" y="4882549"/>
+            <a:ext cx="5416337" cy="364210"/>
+          </a:xfrm>
+          <a:prstGeom prst="straightConnector1">
+            <a:avLst/>
+          </a:prstGeom>
+          <a:ln w="19050">
+            <a:solidFill>
+              <a:schemeClr val="accent5">
+                <a:lumMod val="75000"/>
+              </a:schemeClr>
+            </a:solidFill>
+            <a:tailEnd type="triangle"/>
+          </a:ln>
+        </p:spPr>
+        <p:style>
+          <a:lnRef idx="1">
+            <a:schemeClr val="accent1"/>
+          </a:lnRef>
+          <a:fillRef idx="0">
+            <a:schemeClr val="accent1"/>
+          </a:fillRef>
+          <a:effectRef idx="0">
+            <a:schemeClr val="accent1"/>
+          </a:effectRef>
+          <a:fontRef idx="minor">
+            <a:schemeClr val="tx1"/>
+          </a:fontRef>
+        </p:style>
+      </p:cxnSp>
+      <p:sp>
+        <p:nvSpPr>
+          <p:cNvPr id="94" name="TextBox 93">
+            <a:extLst>
+              <a:ext uri="{FF2B5EF4-FFF2-40B4-BE49-F238E27FC236}">
+                <a16:creationId xmlns:a16="http://schemas.microsoft.com/office/drawing/2014/main" id="{5FDEF61B-F098-4C0D-8C78-18F22FDC78FD}"/>
+              </a:ext>
+            </a:extLst>
+          </p:cNvPr>
+          <p:cNvSpPr txBox="1"/>
+          <p:nvPr/>
+        </p:nvSpPr>
+        <p:spPr>
+          <a:xfrm>
+            <a:off x="8944713" y="4589440"/>
+            <a:ext cx="2761293" cy="646331"/>
+          </a:xfrm>
+          <a:prstGeom prst="rect">
+            <a:avLst/>
+          </a:prstGeom>
+          <a:noFill/>
+        </p:spPr>
+        <p:txBody>
+          <a:bodyPr wrap="square" rtlCol="0">
+            <a:spAutoFit/>
+          </a:bodyPr>
+          <a:lstStyle/>
+          <a:p>
+            <a:r>
+              <a:rPr lang="en-US" sz="1200" dirty="0"/>
+              <a:t>Client either requests additional resources or has enough to display a page.</a:t>
+            </a:r>
+          </a:p>
+        </p:txBody>
+      </p:sp>
+    </p:spTree>
+    <p:extLst>
+      <p:ext uri="{BB962C8B-B14F-4D97-AF65-F5344CB8AC3E}">
+        <p14:creationId xmlns:p14="http://schemas.microsoft.com/office/powerpoint/2010/main" val="1104042506"/>
       </p:ext>
     </p:extLst>
   </p:cSld>

</xml_diff>

<commit_message>
Add http/1.0 v hppt/1.1
</commit_message>
<xml_diff>
--- a/Network Parts and Terms.pptx
+++ b/Network Parts and Terms.pptx
@@ -9,6 +9,7 @@
     <p:sldId id="273" r:id="rId3"/>
     <p:sldId id="274" r:id="rId4"/>
     <p:sldId id="275" r:id="rId5"/>
+    <p:sldId id="276" r:id="rId6"/>
   </p:sldIdLst>
   <p:sldSz cx="12192000" cy="6858000"/>
   <p:notesSz cx="6858000" cy="9144000"/>
@@ -262,7 +263,7 @@
           <a:p>
             <a:fld id="{06ADBE60-9DBF-4AEC-B933-FFCA020856EA}" type="datetimeFigureOut">
               <a:rPr lang="en-US" smtClean="0"/>
-              <a:t>9/10/2020</a:t>
+              <a:t>9/11/2020</a:t>
             </a:fld>
             <a:endParaRPr lang="en-US"/>
           </a:p>
@@ -460,7 +461,7 @@
           <a:p>
             <a:fld id="{06ADBE60-9DBF-4AEC-B933-FFCA020856EA}" type="datetimeFigureOut">
               <a:rPr lang="en-US" smtClean="0"/>
-              <a:t>9/10/2020</a:t>
+              <a:t>9/11/2020</a:t>
             </a:fld>
             <a:endParaRPr lang="en-US"/>
           </a:p>
@@ -668,7 +669,7 @@
           <a:p>
             <a:fld id="{06ADBE60-9DBF-4AEC-B933-FFCA020856EA}" type="datetimeFigureOut">
               <a:rPr lang="en-US" smtClean="0"/>
-              <a:t>9/10/2020</a:t>
+              <a:t>9/11/2020</a:t>
             </a:fld>
             <a:endParaRPr lang="en-US"/>
           </a:p>
@@ -866,7 +867,7 @@
           <a:p>
             <a:fld id="{06ADBE60-9DBF-4AEC-B933-FFCA020856EA}" type="datetimeFigureOut">
               <a:rPr lang="en-US" smtClean="0"/>
-              <a:t>9/10/2020</a:t>
+              <a:t>9/11/2020</a:t>
             </a:fld>
             <a:endParaRPr lang="en-US"/>
           </a:p>
@@ -1141,7 +1142,7 @@
           <a:p>
             <a:fld id="{06ADBE60-9DBF-4AEC-B933-FFCA020856EA}" type="datetimeFigureOut">
               <a:rPr lang="en-US" smtClean="0"/>
-              <a:t>9/10/2020</a:t>
+              <a:t>9/11/2020</a:t>
             </a:fld>
             <a:endParaRPr lang="en-US"/>
           </a:p>
@@ -1406,7 +1407,7 @@
           <a:p>
             <a:fld id="{06ADBE60-9DBF-4AEC-B933-FFCA020856EA}" type="datetimeFigureOut">
               <a:rPr lang="en-US" smtClean="0"/>
-              <a:t>9/10/2020</a:t>
+              <a:t>9/11/2020</a:t>
             </a:fld>
             <a:endParaRPr lang="en-US"/>
           </a:p>
@@ -1818,7 +1819,7 @@
           <a:p>
             <a:fld id="{06ADBE60-9DBF-4AEC-B933-FFCA020856EA}" type="datetimeFigureOut">
               <a:rPr lang="en-US" smtClean="0"/>
-              <a:t>9/10/2020</a:t>
+              <a:t>9/11/2020</a:t>
             </a:fld>
             <a:endParaRPr lang="en-US"/>
           </a:p>
@@ -1959,7 +1960,7 @@
           <a:p>
             <a:fld id="{06ADBE60-9DBF-4AEC-B933-FFCA020856EA}" type="datetimeFigureOut">
               <a:rPr lang="en-US" smtClean="0"/>
-              <a:t>9/10/2020</a:t>
+              <a:t>9/11/2020</a:t>
             </a:fld>
             <a:endParaRPr lang="en-US"/>
           </a:p>
@@ -2072,7 +2073,7 @@
           <a:p>
             <a:fld id="{06ADBE60-9DBF-4AEC-B933-FFCA020856EA}" type="datetimeFigureOut">
               <a:rPr lang="en-US" smtClean="0"/>
-              <a:t>9/10/2020</a:t>
+              <a:t>9/11/2020</a:t>
             </a:fld>
             <a:endParaRPr lang="en-US"/>
           </a:p>
@@ -2383,7 +2384,7 @@
           <a:p>
             <a:fld id="{06ADBE60-9DBF-4AEC-B933-FFCA020856EA}" type="datetimeFigureOut">
               <a:rPr lang="en-US" smtClean="0"/>
-              <a:t>9/10/2020</a:t>
+              <a:t>9/11/2020</a:t>
             </a:fld>
             <a:endParaRPr lang="en-US"/>
           </a:p>
@@ -2671,7 +2672,7 @@
           <a:p>
             <a:fld id="{06ADBE60-9DBF-4AEC-B933-FFCA020856EA}" type="datetimeFigureOut">
               <a:rPr lang="en-US" smtClean="0"/>
-              <a:t>9/10/2020</a:t>
+              <a:t>9/11/2020</a:t>
             </a:fld>
             <a:endParaRPr lang="en-US"/>
           </a:p>
@@ -2912,7 +2913,7 @@
           <a:p>
             <a:fld id="{06ADBE60-9DBF-4AEC-B933-FFCA020856EA}" type="datetimeFigureOut">
               <a:rPr lang="en-US" smtClean="0"/>
-              <a:t>9/10/2020</a:t>
+              <a:t>9/11/2020</a:t>
             </a:fld>
             <a:endParaRPr lang="en-US"/>
           </a:p>
@@ -10147,6 +10148,1462 @@
     <p:extLst>
       <p:ext uri="{BB962C8B-B14F-4D97-AF65-F5344CB8AC3E}">
         <p14:creationId xmlns:p14="http://schemas.microsoft.com/office/powerpoint/2010/main" val="1104042506"/>
+      </p:ext>
+    </p:extLst>
+  </p:cSld>
+  <p:clrMapOvr>
+    <a:masterClrMapping/>
+  </p:clrMapOvr>
+</p:sld>
+</file>
+
+<file path=ppt/slides/slide5.xml><?xml version="1.0" encoding="utf-8"?>
+<p:sld xmlns:a="http://schemas.openxmlformats.org/drawingml/2006/main" xmlns:r="http://schemas.openxmlformats.org/officeDocument/2006/relationships" xmlns:p="http://schemas.openxmlformats.org/presentationml/2006/main">
+  <p:cSld>
+    <p:spTree>
+      <p:nvGrpSpPr>
+        <p:cNvPr id="1" name=""/>
+        <p:cNvGrpSpPr/>
+        <p:nvPr/>
+      </p:nvGrpSpPr>
+      <p:grpSpPr>
+        <a:xfrm>
+          <a:off x="0" y="0"/>
+          <a:ext cx="0" cy="0"/>
+          <a:chOff x="0" y="0"/>
+          <a:chExt cx="0" cy="0"/>
+        </a:xfrm>
+      </p:grpSpPr>
+      <p:sp>
+        <p:nvSpPr>
+          <p:cNvPr id="2" name="Rectangle 1" hidden="1">
+            <a:extLst>
+              <a:ext uri="{FF2B5EF4-FFF2-40B4-BE49-F238E27FC236}">
+                <a16:creationId xmlns:a16="http://schemas.microsoft.com/office/drawing/2014/main" id="{5CCCBFA1-FDCD-4E57-81CE-6E0F8D7901BF}"/>
+              </a:ext>
+            </a:extLst>
+          </p:cNvPr>
+          <p:cNvSpPr/>
+          <p:nvPr/>
+        </p:nvSpPr>
+        <p:spPr>
+          <a:xfrm>
+            <a:off x="0" y="0"/>
+            <a:ext cx="12192000" cy="6858000"/>
+          </a:xfrm>
+          <a:prstGeom prst="rect">
+            <a:avLst/>
+          </a:prstGeom>
+          <a:solidFill>
+            <a:schemeClr val="bg1"/>
+          </a:solidFill>
+          <a:ln>
+            <a:noFill/>
+          </a:ln>
+        </p:spPr>
+        <p:style>
+          <a:lnRef idx="2">
+            <a:schemeClr val="accent1">
+              <a:shade val="50000"/>
+            </a:schemeClr>
+          </a:lnRef>
+          <a:fillRef idx="1">
+            <a:schemeClr val="accent1"/>
+          </a:fillRef>
+          <a:effectRef idx="0">
+            <a:schemeClr val="accent1"/>
+          </a:effectRef>
+          <a:fontRef idx="minor">
+            <a:schemeClr val="lt1"/>
+          </a:fontRef>
+        </p:style>
+        <p:txBody>
+          <a:bodyPr rtlCol="0" anchor="ctr"/>
+          <a:lstStyle/>
+          <a:p>
+            <a:pPr algn="ctr"/>
+            <a:endParaRPr lang="en-US" dirty="0"/>
+          </a:p>
+        </p:txBody>
+      </p:sp>
+      <p:sp>
+        <p:nvSpPr>
+          <p:cNvPr id="38" name="TextBox 37">
+            <a:extLst>
+              <a:ext uri="{FF2B5EF4-FFF2-40B4-BE49-F238E27FC236}">
+                <a16:creationId xmlns:a16="http://schemas.microsoft.com/office/drawing/2014/main" id="{91D2CAB9-EF2E-4B5B-B20A-806B6DD60F42}"/>
+              </a:ext>
+            </a:extLst>
+          </p:cNvPr>
+          <p:cNvSpPr txBox="1"/>
+          <p:nvPr/>
+        </p:nvSpPr>
+        <p:spPr>
+          <a:xfrm>
+            <a:off x="3397135" y="250222"/>
+            <a:ext cx="5397730" cy="523220"/>
+          </a:xfrm>
+          <a:prstGeom prst="rect">
+            <a:avLst/>
+          </a:prstGeom>
+          <a:noFill/>
+        </p:spPr>
+        <p:txBody>
+          <a:bodyPr wrap="square" rtlCol="0">
+            <a:spAutoFit/>
+          </a:bodyPr>
+          <a:lstStyle/>
+          <a:p>
+            <a:pPr algn="ctr"/>
+            <a:r>
+              <a:rPr lang="en-US" sz="2800" dirty="0">
+                <a:solidFill>
+                  <a:schemeClr val="accent6">
+                    <a:lumMod val="75000"/>
+                  </a:schemeClr>
+                </a:solidFill>
+              </a:rPr>
+              <a:t>HTTP Protocol</a:t>
+            </a:r>
+          </a:p>
+        </p:txBody>
+      </p:sp>
+      <p:grpSp>
+        <p:nvGrpSpPr>
+          <p:cNvPr id="49" name="Group 48">
+            <a:extLst>
+              <a:ext uri="{FF2B5EF4-FFF2-40B4-BE49-F238E27FC236}">
+                <a16:creationId xmlns:a16="http://schemas.microsoft.com/office/drawing/2014/main" id="{B8CE06AF-2806-4107-95D9-AAC286CC343B}"/>
+              </a:ext>
+            </a:extLst>
+          </p:cNvPr>
+          <p:cNvGrpSpPr/>
+          <p:nvPr/>
+        </p:nvGrpSpPr>
+        <p:grpSpPr>
+          <a:xfrm>
+            <a:off x="3766877" y="629685"/>
+            <a:ext cx="4498072" cy="297874"/>
+            <a:chOff x="3971469" y="624781"/>
+            <a:chExt cx="4498072" cy="297874"/>
+          </a:xfrm>
+        </p:grpSpPr>
+        <p:cxnSp>
+          <p:nvCxnSpPr>
+            <p:cNvPr id="40" name="Straight Connector 39">
+              <a:extLst>
+                <a:ext uri="{FF2B5EF4-FFF2-40B4-BE49-F238E27FC236}">
+                  <a16:creationId xmlns:a16="http://schemas.microsoft.com/office/drawing/2014/main" id="{D6E0AC31-61D0-4CE2-AA3B-3C6978E8704A}"/>
+                </a:ext>
+              </a:extLst>
+            </p:cNvPr>
+            <p:cNvCxnSpPr/>
+            <p:nvPr/>
+          </p:nvCxnSpPr>
+          <p:spPr>
+            <a:xfrm>
+              <a:off x="5170031" y="773442"/>
+              <a:ext cx="2057400" cy="0"/>
+            </a:xfrm>
+            <a:prstGeom prst="line">
+              <a:avLst/>
+            </a:prstGeom>
+            <a:ln cap="rnd"/>
+          </p:spPr>
+          <p:style>
+            <a:lnRef idx="3">
+              <a:schemeClr val="accent6"/>
+            </a:lnRef>
+            <a:fillRef idx="0">
+              <a:schemeClr val="accent6"/>
+            </a:fillRef>
+            <a:effectRef idx="2">
+              <a:schemeClr val="accent6"/>
+            </a:effectRef>
+            <a:fontRef idx="minor">
+              <a:schemeClr val="tx1"/>
+            </a:fontRef>
+          </p:style>
+        </p:cxnSp>
+        <p:cxnSp>
+          <p:nvCxnSpPr>
+            <p:cNvPr id="41" name="Straight Connector 40">
+              <a:extLst>
+                <a:ext uri="{FF2B5EF4-FFF2-40B4-BE49-F238E27FC236}">
+                  <a16:creationId xmlns:a16="http://schemas.microsoft.com/office/drawing/2014/main" id="{B388F3BF-FB37-4435-8519-443F06647178}"/>
+                </a:ext>
+              </a:extLst>
+            </p:cNvPr>
+            <p:cNvCxnSpPr>
+              <a:cxnSpLocks/>
+            </p:cNvCxnSpPr>
+            <p:nvPr/>
+          </p:nvCxnSpPr>
+          <p:spPr>
+            <a:xfrm>
+              <a:off x="7349270" y="697242"/>
+              <a:ext cx="1027511" cy="0"/>
+            </a:xfrm>
+            <a:prstGeom prst="line">
+              <a:avLst/>
+            </a:prstGeom>
+            <a:ln cap="rnd"/>
+          </p:spPr>
+          <p:style>
+            <a:lnRef idx="3">
+              <a:schemeClr val="accent6"/>
+            </a:lnRef>
+            <a:fillRef idx="0">
+              <a:schemeClr val="accent6"/>
+            </a:fillRef>
+            <a:effectRef idx="2">
+              <a:schemeClr val="accent6"/>
+            </a:effectRef>
+            <a:fontRef idx="minor">
+              <a:schemeClr val="tx1"/>
+            </a:fontRef>
+          </p:style>
+        </p:cxnSp>
+        <p:cxnSp>
+          <p:nvCxnSpPr>
+            <p:cNvPr id="43" name="Straight Connector 42">
+              <a:extLst>
+                <a:ext uri="{FF2B5EF4-FFF2-40B4-BE49-F238E27FC236}">
+                  <a16:creationId xmlns:a16="http://schemas.microsoft.com/office/drawing/2014/main" id="{EC5F7052-9710-4CD3-8A81-EEE0E9A7244C}"/>
+                </a:ext>
+              </a:extLst>
+            </p:cNvPr>
+            <p:cNvCxnSpPr>
+              <a:cxnSpLocks/>
+            </p:cNvCxnSpPr>
+            <p:nvPr/>
+          </p:nvCxnSpPr>
+          <p:spPr>
+            <a:xfrm flipV="1">
+              <a:off x="7227431" y="697242"/>
+              <a:ext cx="121839" cy="76200"/>
+            </a:xfrm>
+            <a:prstGeom prst="line">
+              <a:avLst/>
+            </a:prstGeom>
+            <a:ln cap="rnd"/>
+          </p:spPr>
+          <p:style>
+            <a:lnRef idx="3">
+              <a:schemeClr val="accent6"/>
+            </a:lnRef>
+            <a:fillRef idx="0">
+              <a:schemeClr val="accent6"/>
+            </a:fillRef>
+            <a:effectRef idx="2">
+              <a:schemeClr val="accent6"/>
+            </a:effectRef>
+            <a:fontRef idx="minor">
+              <a:schemeClr val="tx1"/>
+            </a:fontRef>
+          </p:style>
+        </p:cxnSp>
+        <p:cxnSp>
+          <p:nvCxnSpPr>
+            <p:cNvPr id="46" name="Straight Connector 45">
+              <a:extLst>
+                <a:ext uri="{FF2B5EF4-FFF2-40B4-BE49-F238E27FC236}">
+                  <a16:creationId xmlns:a16="http://schemas.microsoft.com/office/drawing/2014/main" id="{C86B609C-3E9D-4EA1-9D7B-7AD108C8C57B}"/>
+                </a:ext>
+              </a:extLst>
+            </p:cNvPr>
+            <p:cNvCxnSpPr>
+              <a:cxnSpLocks/>
+            </p:cNvCxnSpPr>
+            <p:nvPr/>
+          </p:nvCxnSpPr>
+          <p:spPr>
+            <a:xfrm flipV="1">
+              <a:off x="5048192" y="773442"/>
+              <a:ext cx="121839" cy="76200"/>
+            </a:xfrm>
+            <a:prstGeom prst="line">
+              <a:avLst/>
+            </a:prstGeom>
+            <a:ln cap="rnd"/>
+          </p:spPr>
+          <p:style>
+            <a:lnRef idx="3">
+              <a:schemeClr val="accent6"/>
+            </a:lnRef>
+            <a:fillRef idx="0">
+              <a:schemeClr val="accent6"/>
+            </a:fillRef>
+            <a:effectRef idx="2">
+              <a:schemeClr val="accent6"/>
+            </a:effectRef>
+            <a:fontRef idx="minor">
+              <a:schemeClr val="tx1"/>
+            </a:fontRef>
+          </p:style>
+        </p:cxnSp>
+        <p:cxnSp>
+          <p:nvCxnSpPr>
+            <p:cNvPr id="47" name="Straight Connector 46">
+              <a:extLst>
+                <a:ext uri="{FF2B5EF4-FFF2-40B4-BE49-F238E27FC236}">
+                  <a16:creationId xmlns:a16="http://schemas.microsoft.com/office/drawing/2014/main" id="{0D690C07-0109-4CEC-B0CC-434EED608911}"/>
+                </a:ext>
+              </a:extLst>
+            </p:cNvPr>
+            <p:cNvCxnSpPr>
+              <a:cxnSpLocks/>
+            </p:cNvCxnSpPr>
+            <p:nvPr/>
+          </p:nvCxnSpPr>
+          <p:spPr>
+            <a:xfrm flipV="1">
+              <a:off x="4021655" y="849642"/>
+              <a:ext cx="1026537" cy="11668"/>
+            </a:xfrm>
+            <a:prstGeom prst="line">
+              <a:avLst/>
+            </a:prstGeom>
+            <a:ln cap="rnd"/>
+          </p:spPr>
+          <p:style>
+            <a:lnRef idx="3">
+              <a:schemeClr val="accent6"/>
+            </a:lnRef>
+            <a:fillRef idx="0">
+              <a:schemeClr val="accent6"/>
+            </a:fillRef>
+            <a:effectRef idx="2">
+              <a:schemeClr val="accent6"/>
+            </a:effectRef>
+            <a:fontRef idx="minor">
+              <a:schemeClr val="tx1"/>
+            </a:fontRef>
+          </p:style>
+        </p:cxnSp>
+        <p:sp>
+          <p:nvSpPr>
+            <p:cNvPr id="50" name="Oval 49">
+              <a:extLst>
+                <a:ext uri="{FF2B5EF4-FFF2-40B4-BE49-F238E27FC236}">
+                  <a16:creationId xmlns:a16="http://schemas.microsoft.com/office/drawing/2014/main" id="{EEA3A56A-D77B-4804-9467-3C2325189A39}"/>
+                </a:ext>
+              </a:extLst>
+            </p:cNvPr>
+            <p:cNvSpPr/>
+            <p:nvPr/>
+          </p:nvSpPr>
+          <p:spPr>
+            <a:xfrm>
+              <a:off x="3971469" y="789305"/>
+              <a:ext cx="133350" cy="133350"/>
+            </a:xfrm>
+            <a:prstGeom prst="ellipse">
+              <a:avLst/>
+            </a:prstGeom>
+          </p:spPr>
+          <p:style>
+            <a:lnRef idx="2">
+              <a:schemeClr val="accent6"/>
+            </a:lnRef>
+            <a:fillRef idx="1">
+              <a:schemeClr val="lt1"/>
+            </a:fillRef>
+            <a:effectRef idx="0">
+              <a:schemeClr val="accent6"/>
+            </a:effectRef>
+            <a:fontRef idx="minor">
+              <a:schemeClr val="dk1"/>
+            </a:fontRef>
+          </p:style>
+          <p:txBody>
+            <a:bodyPr rtlCol="0" anchor="ctr"/>
+            <a:lstStyle/>
+            <a:p>
+              <a:pPr algn="ctr"/>
+              <a:endParaRPr lang="en-US" i="1" dirty="0"/>
+            </a:p>
+          </p:txBody>
+        </p:sp>
+        <p:sp>
+          <p:nvSpPr>
+            <p:cNvPr id="51" name="Oval 50">
+              <a:extLst>
+                <a:ext uri="{FF2B5EF4-FFF2-40B4-BE49-F238E27FC236}">
+                  <a16:creationId xmlns:a16="http://schemas.microsoft.com/office/drawing/2014/main" id="{488A40C9-3C11-477D-B0FB-19648893F367}"/>
+                </a:ext>
+              </a:extLst>
+            </p:cNvPr>
+            <p:cNvSpPr/>
+            <p:nvPr/>
+          </p:nvSpPr>
+          <p:spPr>
+            <a:xfrm>
+              <a:off x="8336191" y="624781"/>
+              <a:ext cx="133350" cy="133350"/>
+            </a:xfrm>
+            <a:prstGeom prst="ellipse">
+              <a:avLst/>
+            </a:prstGeom>
+          </p:spPr>
+          <p:style>
+            <a:lnRef idx="2">
+              <a:schemeClr val="accent6"/>
+            </a:lnRef>
+            <a:fillRef idx="1">
+              <a:schemeClr val="lt1"/>
+            </a:fillRef>
+            <a:effectRef idx="0">
+              <a:schemeClr val="accent6"/>
+            </a:effectRef>
+            <a:fontRef idx="minor">
+              <a:schemeClr val="dk1"/>
+            </a:fontRef>
+          </p:style>
+          <p:txBody>
+            <a:bodyPr rtlCol="0" anchor="ctr"/>
+            <a:lstStyle/>
+            <a:p>
+              <a:pPr algn="ctr"/>
+              <a:endParaRPr lang="en-US" i="1" dirty="0"/>
+            </a:p>
+          </p:txBody>
+        </p:sp>
+      </p:grpSp>
+      <p:cxnSp>
+        <p:nvCxnSpPr>
+          <p:cNvPr id="56" name="Straight Connector 55">
+            <a:extLst>
+              <a:ext uri="{FF2B5EF4-FFF2-40B4-BE49-F238E27FC236}">
+                <a16:creationId xmlns:a16="http://schemas.microsoft.com/office/drawing/2014/main" id="{F9C26875-AC4A-4148-B81A-A4A8ABC00888}"/>
+              </a:ext>
+            </a:extLst>
+          </p:cNvPr>
+          <p:cNvCxnSpPr>
+            <a:cxnSpLocks/>
+          </p:cNvCxnSpPr>
+          <p:nvPr/>
+        </p:nvCxnSpPr>
+        <p:spPr>
+          <a:xfrm flipV="1">
+            <a:off x="705308" y="1292603"/>
+            <a:ext cx="2396815" cy="13201"/>
+          </a:xfrm>
+          <a:prstGeom prst="line">
+            <a:avLst/>
+          </a:prstGeom>
+          <a:ln cap="rnd"/>
+        </p:spPr>
+        <p:style>
+          <a:lnRef idx="3">
+            <a:schemeClr val="accent6"/>
+          </a:lnRef>
+          <a:fillRef idx="0">
+            <a:schemeClr val="accent6"/>
+          </a:fillRef>
+          <a:effectRef idx="2">
+            <a:schemeClr val="accent6"/>
+          </a:effectRef>
+          <a:fontRef idx="minor">
+            <a:schemeClr val="tx1"/>
+          </a:fontRef>
+        </p:style>
+      </p:cxnSp>
+      <p:sp>
+        <p:nvSpPr>
+          <p:cNvPr id="57" name="Oval 56">
+            <a:extLst>
+              <a:ext uri="{FF2B5EF4-FFF2-40B4-BE49-F238E27FC236}">
+                <a16:creationId xmlns:a16="http://schemas.microsoft.com/office/drawing/2014/main" id="{370F3CE1-9CF7-43B0-83BB-E40DAD752FE1}"/>
+              </a:ext>
+            </a:extLst>
+          </p:cNvPr>
+          <p:cNvSpPr/>
+          <p:nvPr/>
+        </p:nvSpPr>
+        <p:spPr>
+          <a:xfrm>
+            <a:off x="3054497" y="1225928"/>
+            <a:ext cx="133350" cy="133350"/>
+          </a:xfrm>
+          <a:prstGeom prst="ellipse">
+            <a:avLst/>
+          </a:prstGeom>
+        </p:spPr>
+        <p:style>
+          <a:lnRef idx="2">
+            <a:schemeClr val="accent6"/>
+          </a:lnRef>
+          <a:fillRef idx="1">
+            <a:schemeClr val="lt1"/>
+          </a:fillRef>
+          <a:effectRef idx="0">
+            <a:schemeClr val="accent6"/>
+          </a:effectRef>
+          <a:fontRef idx="minor">
+            <a:schemeClr val="dk1"/>
+          </a:fontRef>
+        </p:style>
+        <p:txBody>
+          <a:bodyPr rtlCol="0" anchor="ctr"/>
+          <a:lstStyle/>
+          <a:p>
+            <a:pPr algn="ctr"/>
+            <a:endParaRPr lang="en-US" dirty="0"/>
+          </a:p>
+        </p:txBody>
+      </p:sp>
+      <p:sp>
+        <p:nvSpPr>
+          <p:cNvPr id="58" name="TextBox 57">
+            <a:extLst>
+              <a:ext uri="{FF2B5EF4-FFF2-40B4-BE49-F238E27FC236}">
+                <a16:creationId xmlns:a16="http://schemas.microsoft.com/office/drawing/2014/main" id="{3DEDC128-6118-4E0E-8088-7FED3274461A}"/>
+              </a:ext>
+            </a:extLst>
+          </p:cNvPr>
+          <p:cNvSpPr txBox="1"/>
+          <p:nvPr/>
+        </p:nvSpPr>
+        <p:spPr>
+          <a:xfrm>
+            <a:off x="705308" y="936472"/>
+            <a:ext cx="1019766" cy="369332"/>
+          </a:xfrm>
+          <a:prstGeom prst="rect">
+            <a:avLst/>
+          </a:prstGeom>
+          <a:noFill/>
+        </p:spPr>
+        <p:txBody>
+          <a:bodyPr wrap="none" rtlCol="0">
+            <a:spAutoFit/>
+          </a:bodyPr>
+          <a:lstStyle/>
+          <a:p>
+            <a:r>
+              <a:rPr lang="en-US" dirty="0">
+                <a:solidFill>
+                  <a:schemeClr val="accent6">
+                    <a:lumMod val="75000"/>
+                  </a:schemeClr>
+                </a:solidFill>
+              </a:rPr>
+              <a:t>HTTP 1.0</a:t>
+            </a:r>
+          </a:p>
+        </p:txBody>
+      </p:sp>
+      <p:cxnSp>
+        <p:nvCxnSpPr>
+          <p:cNvPr id="22" name="Straight Connector 21">
+            <a:extLst>
+              <a:ext uri="{FF2B5EF4-FFF2-40B4-BE49-F238E27FC236}">
+                <a16:creationId xmlns:a16="http://schemas.microsoft.com/office/drawing/2014/main" id="{FF385047-39B6-4C0C-88C7-0CA9881E85BD}"/>
+              </a:ext>
+            </a:extLst>
+          </p:cNvPr>
+          <p:cNvCxnSpPr>
+            <a:cxnSpLocks/>
+          </p:cNvCxnSpPr>
+          <p:nvPr/>
+        </p:nvCxnSpPr>
+        <p:spPr>
+          <a:xfrm flipV="1">
+            <a:off x="8794865" y="1346077"/>
+            <a:ext cx="2396815" cy="13201"/>
+          </a:xfrm>
+          <a:prstGeom prst="line">
+            <a:avLst/>
+          </a:prstGeom>
+          <a:ln cap="rnd"/>
+        </p:spPr>
+        <p:style>
+          <a:lnRef idx="3">
+            <a:schemeClr val="accent6"/>
+          </a:lnRef>
+          <a:fillRef idx="0">
+            <a:schemeClr val="accent6"/>
+          </a:fillRef>
+          <a:effectRef idx="2">
+            <a:schemeClr val="accent6"/>
+          </a:effectRef>
+          <a:fontRef idx="minor">
+            <a:schemeClr val="tx1"/>
+          </a:fontRef>
+        </p:style>
+      </p:cxnSp>
+      <p:sp>
+        <p:nvSpPr>
+          <p:cNvPr id="23" name="Oval 22">
+            <a:extLst>
+              <a:ext uri="{FF2B5EF4-FFF2-40B4-BE49-F238E27FC236}">
+                <a16:creationId xmlns:a16="http://schemas.microsoft.com/office/drawing/2014/main" id="{FDA49A48-C0FD-4610-AFFE-4CF8A8064543}"/>
+              </a:ext>
+            </a:extLst>
+          </p:cNvPr>
+          <p:cNvSpPr/>
+          <p:nvPr/>
+        </p:nvSpPr>
+        <p:spPr>
+          <a:xfrm>
+            <a:off x="8709141" y="1279402"/>
+            <a:ext cx="133350" cy="133350"/>
+          </a:xfrm>
+          <a:prstGeom prst="ellipse">
+            <a:avLst/>
+          </a:prstGeom>
+        </p:spPr>
+        <p:style>
+          <a:lnRef idx="2">
+            <a:schemeClr val="accent6"/>
+          </a:lnRef>
+          <a:fillRef idx="1">
+            <a:schemeClr val="lt1"/>
+          </a:fillRef>
+          <a:effectRef idx="0">
+            <a:schemeClr val="accent6"/>
+          </a:effectRef>
+          <a:fontRef idx="minor">
+            <a:schemeClr val="dk1"/>
+          </a:fontRef>
+        </p:style>
+        <p:txBody>
+          <a:bodyPr rtlCol="0" anchor="ctr"/>
+          <a:lstStyle/>
+          <a:p>
+            <a:pPr algn="ctr"/>
+            <a:endParaRPr lang="en-US" dirty="0"/>
+          </a:p>
+        </p:txBody>
+      </p:sp>
+      <p:sp>
+        <p:nvSpPr>
+          <p:cNvPr id="24" name="TextBox 23">
+            <a:extLst>
+              <a:ext uri="{FF2B5EF4-FFF2-40B4-BE49-F238E27FC236}">
+                <a16:creationId xmlns:a16="http://schemas.microsoft.com/office/drawing/2014/main" id="{07657E45-5A07-4AFF-9BE7-C7006CFE6366}"/>
+              </a:ext>
+            </a:extLst>
+          </p:cNvPr>
+          <p:cNvSpPr txBox="1"/>
+          <p:nvPr/>
+        </p:nvSpPr>
+        <p:spPr>
+          <a:xfrm>
+            <a:off x="10171914" y="983345"/>
+            <a:ext cx="1019766" cy="369332"/>
+          </a:xfrm>
+          <a:prstGeom prst="rect">
+            <a:avLst/>
+          </a:prstGeom>
+          <a:noFill/>
+        </p:spPr>
+        <p:txBody>
+          <a:bodyPr wrap="none" rtlCol="0">
+            <a:spAutoFit/>
+          </a:bodyPr>
+          <a:lstStyle/>
+          <a:p>
+            <a:r>
+              <a:rPr lang="en-US" dirty="0">
+                <a:solidFill>
+                  <a:schemeClr val="accent6">
+                    <a:lumMod val="75000"/>
+                  </a:schemeClr>
+                </a:solidFill>
+              </a:rPr>
+              <a:t>HTTP 1.1</a:t>
+            </a:r>
+          </a:p>
+        </p:txBody>
+      </p:sp>
+      <p:sp>
+        <p:nvSpPr>
+          <p:cNvPr id="5" name="TextBox 4">
+            <a:extLst>
+              <a:ext uri="{FF2B5EF4-FFF2-40B4-BE49-F238E27FC236}">
+                <a16:creationId xmlns:a16="http://schemas.microsoft.com/office/drawing/2014/main" id="{AFA644A6-78CB-4CA4-8F3A-246179F623AC}"/>
+              </a:ext>
+            </a:extLst>
+          </p:cNvPr>
+          <p:cNvSpPr txBox="1"/>
+          <p:nvPr/>
+        </p:nvSpPr>
+        <p:spPr>
+          <a:xfrm>
+            <a:off x="654536" y="1305804"/>
+            <a:ext cx="2314237" cy="923330"/>
+          </a:xfrm>
+          <a:prstGeom prst="rect">
+            <a:avLst/>
+          </a:prstGeom>
+          <a:noFill/>
+        </p:spPr>
+        <p:txBody>
+          <a:bodyPr wrap="square" rtlCol="0">
+            <a:spAutoFit/>
+          </a:bodyPr>
+          <a:lstStyle/>
+          <a:p>
+            <a:r>
+              <a:rPr lang="en-US" dirty="0"/>
+              <a:t>Non-persistent.</a:t>
+            </a:r>
+          </a:p>
+          <a:p>
+            <a:r>
+              <a:rPr lang="en-US" dirty="0"/>
+              <a:t>You can only make one request at a time.</a:t>
+            </a:r>
+          </a:p>
+        </p:txBody>
+      </p:sp>
+      <p:sp>
+        <p:nvSpPr>
+          <p:cNvPr id="6" name="TextBox 5">
+            <a:extLst>
+              <a:ext uri="{FF2B5EF4-FFF2-40B4-BE49-F238E27FC236}">
+                <a16:creationId xmlns:a16="http://schemas.microsoft.com/office/drawing/2014/main" id="{2529A270-11E6-4230-8E8E-5B9958C92DD5}"/>
+              </a:ext>
+            </a:extLst>
+          </p:cNvPr>
+          <p:cNvSpPr txBox="1"/>
+          <p:nvPr/>
+        </p:nvSpPr>
+        <p:spPr>
+          <a:xfrm>
+            <a:off x="8947421" y="1425953"/>
+            <a:ext cx="2314237" cy="923330"/>
+          </a:xfrm>
+          <a:prstGeom prst="rect">
+            <a:avLst/>
+          </a:prstGeom>
+          <a:noFill/>
+        </p:spPr>
+        <p:txBody>
+          <a:bodyPr wrap="square" rtlCol="0">
+            <a:spAutoFit/>
+          </a:bodyPr>
+          <a:lstStyle/>
+          <a:p>
+            <a:pPr algn="r"/>
+            <a:r>
+              <a:rPr lang="en-US" dirty="0"/>
+              <a:t>Most notably, maintains a persistent connection.</a:t>
+            </a:r>
+          </a:p>
+        </p:txBody>
+      </p:sp>
+      <p:pic>
+        <p:nvPicPr>
+          <p:cNvPr id="10" name="Picture 9" descr="A person talking on a cell phone&#10;&#10;Description automatically generated">
+            <a:extLst>
+              <a:ext uri="{FF2B5EF4-FFF2-40B4-BE49-F238E27FC236}">
+                <a16:creationId xmlns:a16="http://schemas.microsoft.com/office/drawing/2014/main" id="{3328465B-EB4B-4EF7-BBAB-ADCB6F371864}"/>
+              </a:ext>
+            </a:extLst>
+          </p:cNvPr>
+          <p:cNvPicPr>
+            <a:picLocks noChangeAspect="1"/>
+          </p:cNvPicPr>
+          <p:nvPr/>
+        </p:nvPicPr>
+        <p:blipFill rotWithShape="1">
+          <a:blip r:embed="rId2">
+            <a:extLst>
+              <a:ext uri="{28A0092B-C50C-407E-A947-70E740481C1C}">
+                <a14:useLocalDpi xmlns:a14="http://schemas.microsoft.com/office/drawing/2010/main" val="0"/>
+              </a:ext>
+            </a:extLst>
+          </a:blip>
+          <a:srcRect r="38919"/>
+          <a:stretch/>
+        </p:blipFill>
+        <p:spPr>
+          <a:xfrm>
+            <a:off x="706097" y="2287576"/>
+            <a:ext cx="970449" cy="1059189"/>
+          </a:xfrm>
+          <a:prstGeom prst="rect">
+            <a:avLst/>
+          </a:prstGeom>
+        </p:spPr>
+      </p:pic>
+      <p:pic>
+        <p:nvPicPr>
+          <p:cNvPr id="12" name="Picture 11" descr="A picture containing person, person, table, piece&#10;&#10;Description automatically generated">
+            <a:extLst>
+              <a:ext uri="{FF2B5EF4-FFF2-40B4-BE49-F238E27FC236}">
+                <a16:creationId xmlns:a16="http://schemas.microsoft.com/office/drawing/2014/main" id="{9172FA0A-3E01-4D8B-8FBF-28A0A91C4B9E}"/>
+              </a:ext>
+            </a:extLst>
+          </p:cNvPr>
+          <p:cNvPicPr>
+            <a:picLocks noChangeAspect="1"/>
+          </p:cNvPicPr>
+          <p:nvPr/>
+        </p:nvPicPr>
+        <p:blipFill>
+          <a:blip r:embed="rId3">
+            <a:extLst>
+              <a:ext uri="{28A0092B-C50C-407E-A947-70E740481C1C}">
+                <a14:useLocalDpi xmlns:a14="http://schemas.microsoft.com/office/drawing/2010/main" val="0"/>
+              </a:ext>
+            </a:extLst>
+          </a:blip>
+          <a:stretch>
+            <a:fillRect/>
+          </a:stretch>
+        </p:blipFill>
+        <p:spPr>
+          <a:xfrm>
+            <a:off x="3942246" y="2290417"/>
+            <a:ext cx="704232" cy="1056348"/>
+          </a:xfrm>
+          <a:prstGeom prst="rect">
+            <a:avLst/>
+          </a:prstGeom>
+        </p:spPr>
+      </p:pic>
+      <p:sp>
+        <p:nvSpPr>
+          <p:cNvPr id="13" name="TextBox 12">
+            <a:extLst>
+              <a:ext uri="{FF2B5EF4-FFF2-40B4-BE49-F238E27FC236}">
+                <a16:creationId xmlns:a16="http://schemas.microsoft.com/office/drawing/2014/main" id="{ED068B14-56DD-4D5A-A661-2E50D9886EA3}"/>
+              </a:ext>
+            </a:extLst>
+          </p:cNvPr>
+          <p:cNvSpPr txBox="1"/>
+          <p:nvPr/>
+        </p:nvSpPr>
+        <p:spPr>
+          <a:xfrm>
+            <a:off x="31911" y="6596390"/>
+            <a:ext cx="5873724" cy="261610"/>
+          </a:xfrm>
+          <a:prstGeom prst="rect">
+            <a:avLst/>
+          </a:prstGeom>
+          <a:noFill/>
+        </p:spPr>
+        <p:txBody>
+          <a:bodyPr wrap="none" rtlCol="0">
+            <a:spAutoFit/>
+          </a:bodyPr>
+          <a:lstStyle/>
+          <a:p>
+            <a:r>
+              <a:rPr lang="en-US" sz="1100" dirty="0">
+                <a:solidFill>
+                  <a:schemeClr val="bg1">
+                    <a:lumMod val="65000"/>
+                  </a:schemeClr>
+                </a:solidFill>
+              </a:rPr>
+              <a:t>Photos courtesy Pexels.com and are subject to the </a:t>
+            </a:r>
+            <a:r>
+              <a:rPr lang="en-US" sz="1100" dirty="0" err="1">
+                <a:solidFill>
+                  <a:schemeClr val="bg1">
+                    <a:lumMod val="65000"/>
+                  </a:schemeClr>
+                </a:solidFill>
+              </a:rPr>
+              <a:t>pexels</a:t>
+            </a:r>
+            <a:r>
+              <a:rPr lang="en-US" sz="1100" dirty="0">
+                <a:solidFill>
+                  <a:schemeClr val="bg1">
+                    <a:lumMod val="65000"/>
+                  </a:schemeClr>
+                </a:solidFill>
+              </a:rPr>
+              <a:t> license, https://www.pexels.com/license/</a:t>
+            </a:r>
+          </a:p>
+        </p:txBody>
+      </p:sp>
+      <p:cxnSp>
+        <p:nvCxnSpPr>
+          <p:cNvPr id="15" name="Straight Arrow Connector 14">
+            <a:extLst>
+              <a:ext uri="{FF2B5EF4-FFF2-40B4-BE49-F238E27FC236}">
+                <a16:creationId xmlns:a16="http://schemas.microsoft.com/office/drawing/2014/main" id="{75728BC6-CFFE-45B1-A626-E835958584E0}"/>
+              </a:ext>
+            </a:extLst>
+          </p:cNvPr>
+          <p:cNvCxnSpPr>
+            <a:cxnSpLocks/>
+            <a:stCxn id="10" idx="3"/>
+            <a:endCxn id="12" idx="1"/>
+          </p:cNvCxnSpPr>
+          <p:nvPr/>
+        </p:nvCxnSpPr>
+        <p:spPr>
+          <a:xfrm>
+            <a:off x="1676546" y="2817171"/>
+            <a:ext cx="2265700" cy="1420"/>
+          </a:xfrm>
+          <a:prstGeom prst="straightConnector1">
+            <a:avLst/>
+          </a:prstGeom>
+          <a:ln w="28575">
+            <a:solidFill>
+              <a:schemeClr val="accent6"/>
+            </a:solidFill>
+            <a:tailEnd type="triangle"/>
+          </a:ln>
+        </p:spPr>
+        <p:style>
+          <a:lnRef idx="1">
+            <a:schemeClr val="accent1"/>
+          </a:lnRef>
+          <a:fillRef idx="0">
+            <a:schemeClr val="accent1"/>
+          </a:fillRef>
+          <a:effectRef idx="0">
+            <a:schemeClr val="accent1"/>
+          </a:effectRef>
+          <a:fontRef idx="minor">
+            <a:schemeClr val="tx1"/>
+          </a:fontRef>
+        </p:style>
+      </p:cxnSp>
+      <p:sp>
+        <p:nvSpPr>
+          <p:cNvPr id="16" name="TextBox 15">
+            <a:extLst>
+              <a:ext uri="{FF2B5EF4-FFF2-40B4-BE49-F238E27FC236}">
+                <a16:creationId xmlns:a16="http://schemas.microsoft.com/office/drawing/2014/main" id="{A1D2FAB3-4411-4C5D-A33C-6B3C58F6BC88}"/>
+              </a:ext>
+            </a:extLst>
+          </p:cNvPr>
+          <p:cNvSpPr txBox="1"/>
+          <p:nvPr/>
+        </p:nvSpPr>
+        <p:spPr>
+          <a:xfrm>
+            <a:off x="1828873" y="2343820"/>
+            <a:ext cx="1961045" cy="738664"/>
+          </a:xfrm>
+          <a:prstGeom prst="rect">
+            <a:avLst/>
+          </a:prstGeom>
+          <a:noFill/>
+        </p:spPr>
+        <p:txBody>
+          <a:bodyPr wrap="square" rtlCol="0">
+            <a:spAutoFit/>
+          </a:bodyPr>
+          <a:lstStyle/>
+          <a:p>
+            <a:r>
+              <a:rPr lang="en-US" sz="1400" i="1" dirty="0"/>
+              <a:t>Hello, I’d like to order a cheese pizza.</a:t>
+            </a:r>
+          </a:p>
+          <a:p>
+            <a:r>
+              <a:rPr lang="en-US" sz="1400" i="1" dirty="0"/>
+              <a:t>Goodbye.</a:t>
+            </a:r>
+          </a:p>
+        </p:txBody>
+      </p:sp>
+      <p:pic>
+        <p:nvPicPr>
+          <p:cNvPr id="55" name="Picture 54" descr="A person talking on a cell phone&#10;&#10;Description automatically generated">
+            <a:extLst>
+              <a:ext uri="{FF2B5EF4-FFF2-40B4-BE49-F238E27FC236}">
+                <a16:creationId xmlns:a16="http://schemas.microsoft.com/office/drawing/2014/main" id="{60E50734-85DA-461F-B507-202CF160B17D}"/>
+              </a:ext>
+            </a:extLst>
+          </p:cNvPr>
+          <p:cNvPicPr>
+            <a:picLocks noChangeAspect="1"/>
+          </p:cNvPicPr>
+          <p:nvPr/>
+        </p:nvPicPr>
+        <p:blipFill rotWithShape="1">
+          <a:blip r:embed="rId2">
+            <a:extLst>
+              <a:ext uri="{28A0092B-C50C-407E-A947-70E740481C1C}">
+                <a14:useLocalDpi xmlns:a14="http://schemas.microsoft.com/office/drawing/2010/main" val="0"/>
+              </a:ext>
+            </a:extLst>
+          </a:blip>
+          <a:srcRect r="38919"/>
+          <a:stretch/>
+        </p:blipFill>
+        <p:spPr>
+          <a:xfrm>
+            <a:off x="706097" y="3486370"/>
+            <a:ext cx="970449" cy="1059189"/>
+          </a:xfrm>
+          <a:prstGeom prst="rect">
+            <a:avLst/>
+          </a:prstGeom>
+        </p:spPr>
+      </p:pic>
+      <p:pic>
+        <p:nvPicPr>
+          <p:cNvPr id="62" name="Picture 61" descr="A picture containing person, person, table, piece&#10;&#10;Description automatically generated">
+            <a:extLst>
+              <a:ext uri="{FF2B5EF4-FFF2-40B4-BE49-F238E27FC236}">
+                <a16:creationId xmlns:a16="http://schemas.microsoft.com/office/drawing/2014/main" id="{2961CFF9-D164-4369-91E2-5F799F6A003D}"/>
+              </a:ext>
+            </a:extLst>
+          </p:cNvPr>
+          <p:cNvPicPr>
+            <a:picLocks noChangeAspect="1"/>
+          </p:cNvPicPr>
+          <p:nvPr/>
+        </p:nvPicPr>
+        <p:blipFill>
+          <a:blip r:embed="rId3">
+            <a:extLst>
+              <a:ext uri="{28A0092B-C50C-407E-A947-70E740481C1C}">
+                <a14:useLocalDpi xmlns:a14="http://schemas.microsoft.com/office/drawing/2010/main" val="0"/>
+              </a:ext>
+            </a:extLst>
+          </a:blip>
+          <a:stretch>
+            <a:fillRect/>
+          </a:stretch>
+        </p:blipFill>
+        <p:spPr>
+          <a:xfrm>
+            <a:off x="3942246" y="3489211"/>
+            <a:ext cx="704232" cy="1056348"/>
+          </a:xfrm>
+          <a:prstGeom prst="rect">
+            <a:avLst/>
+          </a:prstGeom>
+        </p:spPr>
+      </p:pic>
+      <p:cxnSp>
+        <p:nvCxnSpPr>
+          <p:cNvPr id="63" name="Straight Arrow Connector 62">
+            <a:extLst>
+              <a:ext uri="{FF2B5EF4-FFF2-40B4-BE49-F238E27FC236}">
+                <a16:creationId xmlns:a16="http://schemas.microsoft.com/office/drawing/2014/main" id="{C2684338-5F79-43C0-B2FF-EDE739B39D22}"/>
+              </a:ext>
+            </a:extLst>
+          </p:cNvPr>
+          <p:cNvCxnSpPr>
+            <a:cxnSpLocks/>
+            <a:stCxn id="55" idx="3"/>
+            <a:endCxn id="62" idx="1"/>
+          </p:cNvCxnSpPr>
+          <p:nvPr/>
+        </p:nvCxnSpPr>
+        <p:spPr>
+          <a:xfrm>
+            <a:off x="1676546" y="4015965"/>
+            <a:ext cx="2265700" cy="1420"/>
+          </a:xfrm>
+          <a:prstGeom prst="straightConnector1">
+            <a:avLst/>
+          </a:prstGeom>
+          <a:ln w="28575">
+            <a:solidFill>
+              <a:schemeClr val="accent6"/>
+            </a:solidFill>
+            <a:tailEnd type="triangle"/>
+          </a:ln>
+        </p:spPr>
+        <p:style>
+          <a:lnRef idx="1">
+            <a:schemeClr val="accent1"/>
+          </a:lnRef>
+          <a:fillRef idx="0">
+            <a:schemeClr val="accent1"/>
+          </a:fillRef>
+          <a:effectRef idx="0">
+            <a:schemeClr val="accent1"/>
+          </a:effectRef>
+          <a:fontRef idx="minor">
+            <a:schemeClr val="tx1"/>
+          </a:fontRef>
+        </p:style>
+      </p:cxnSp>
+      <p:sp>
+        <p:nvSpPr>
+          <p:cNvPr id="64" name="TextBox 63">
+            <a:extLst>
+              <a:ext uri="{FF2B5EF4-FFF2-40B4-BE49-F238E27FC236}">
+                <a16:creationId xmlns:a16="http://schemas.microsoft.com/office/drawing/2014/main" id="{F6D32020-4CEA-4109-A13E-71CD39F9EB79}"/>
+              </a:ext>
+            </a:extLst>
+          </p:cNvPr>
+          <p:cNvSpPr txBox="1"/>
+          <p:nvPr/>
+        </p:nvSpPr>
+        <p:spPr>
+          <a:xfrm>
+            <a:off x="1828873" y="3542614"/>
+            <a:ext cx="1961045" cy="738664"/>
+          </a:xfrm>
+          <a:prstGeom prst="rect">
+            <a:avLst/>
+          </a:prstGeom>
+          <a:noFill/>
+        </p:spPr>
+        <p:txBody>
+          <a:bodyPr wrap="square" rtlCol="0">
+            <a:spAutoFit/>
+          </a:bodyPr>
+          <a:lstStyle/>
+          <a:p>
+            <a:r>
+              <a:rPr lang="en-US" sz="1400" i="1" dirty="0"/>
+              <a:t>Hello, I’d like to order a pepperoni pizza.</a:t>
+            </a:r>
+          </a:p>
+          <a:p>
+            <a:r>
+              <a:rPr lang="en-US" sz="1400" i="1" dirty="0"/>
+              <a:t>Goodbye.</a:t>
+            </a:r>
+          </a:p>
+        </p:txBody>
+      </p:sp>
+      <p:pic>
+        <p:nvPicPr>
+          <p:cNvPr id="65" name="Picture 64" descr="A person talking on a cell phone&#10;&#10;Description automatically generated">
+            <a:extLst>
+              <a:ext uri="{FF2B5EF4-FFF2-40B4-BE49-F238E27FC236}">
+                <a16:creationId xmlns:a16="http://schemas.microsoft.com/office/drawing/2014/main" id="{71365F1E-2259-4092-A2F4-1F48BDDF1789}"/>
+              </a:ext>
+            </a:extLst>
+          </p:cNvPr>
+          <p:cNvPicPr>
+            <a:picLocks noChangeAspect="1"/>
+          </p:cNvPicPr>
+          <p:nvPr/>
+        </p:nvPicPr>
+        <p:blipFill rotWithShape="1">
+          <a:blip r:embed="rId2">
+            <a:extLst>
+              <a:ext uri="{28A0092B-C50C-407E-A947-70E740481C1C}">
+                <a14:useLocalDpi xmlns:a14="http://schemas.microsoft.com/office/drawing/2010/main" val="0"/>
+              </a:ext>
+            </a:extLst>
+          </a:blip>
+          <a:srcRect r="38919"/>
+          <a:stretch/>
+        </p:blipFill>
+        <p:spPr>
+          <a:xfrm>
+            <a:off x="706097" y="4738567"/>
+            <a:ext cx="970449" cy="1059189"/>
+          </a:xfrm>
+          <a:prstGeom prst="rect">
+            <a:avLst/>
+          </a:prstGeom>
+        </p:spPr>
+      </p:pic>
+      <p:pic>
+        <p:nvPicPr>
+          <p:cNvPr id="66" name="Picture 65" descr="A picture containing person, person, table, piece&#10;&#10;Description automatically generated">
+            <a:extLst>
+              <a:ext uri="{FF2B5EF4-FFF2-40B4-BE49-F238E27FC236}">
+                <a16:creationId xmlns:a16="http://schemas.microsoft.com/office/drawing/2014/main" id="{A0E5CC74-A7FF-4447-8248-156C3AC95DF5}"/>
+              </a:ext>
+            </a:extLst>
+          </p:cNvPr>
+          <p:cNvPicPr>
+            <a:picLocks noChangeAspect="1"/>
+          </p:cNvPicPr>
+          <p:nvPr/>
+        </p:nvPicPr>
+        <p:blipFill>
+          <a:blip r:embed="rId3">
+            <a:extLst>
+              <a:ext uri="{28A0092B-C50C-407E-A947-70E740481C1C}">
+                <a14:useLocalDpi xmlns:a14="http://schemas.microsoft.com/office/drawing/2010/main" val="0"/>
+              </a:ext>
+            </a:extLst>
+          </a:blip>
+          <a:stretch>
+            <a:fillRect/>
+          </a:stretch>
+        </p:blipFill>
+        <p:spPr>
+          <a:xfrm>
+            <a:off x="3942246" y="4741408"/>
+            <a:ext cx="704232" cy="1056348"/>
+          </a:xfrm>
+          <a:prstGeom prst="rect">
+            <a:avLst/>
+          </a:prstGeom>
+        </p:spPr>
+      </p:pic>
+      <p:cxnSp>
+        <p:nvCxnSpPr>
+          <p:cNvPr id="67" name="Straight Arrow Connector 66">
+            <a:extLst>
+              <a:ext uri="{FF2B5EF4-FFF2-40B4-BE49-F238E27FC236}">
+                <a16:creationId xmlns:a16="http://schemas.microsoft.com/office/drawing/2014/main" id="{409122E7-970B-477B-A79B-30DE4894BC83}"/>
+              </a:ext>
+            </a:extLst>
+          </p:cNvPr>
+          <p:cNvCxnSpPr>
+            <a:cxnSpLocks/>
+            <a:stCxn id="65" idx="3"/>
+            <a:endCxn id="66" idx="1"/>
+          </p:cNvCxnSpPr>
+          <p:nvPr/>
+        </p:nvCxnSpPr>
+        <p:spPr>
+          <a:xfrm>
+            <a:off x="1676546" y="5268162"/>
+            <a:ext cx="2265700" cy="1420"/>
+          </a:xfrm>
+          <a:prstGeom prst="straightConnector1">
+            <a:avLst/>
+          </a:prstGeom>
+          <a:ln w="28575">
+            <a:solidFill>
+              <a:schemeClr val="accent6"/>
+            </a:solidFill>
+            <a:tailEnd type="triangle"/>
+          </a:ln>
+        </p:spPr>
+        <p:style>
+          <a:lnRef idx="1">
+            <a:schemeClr val="accent1"/>
+          </a:lnRef>
+          <a:fillRef idx="0">
+            <a:schemeClr val="accent1"/>
+          </a:fillRef>
+          <a:effectRef idx="0">
+            <a:schemeClr val="accent1"/>
+          </a:effectRef>
+          <a:fontRef idx="minor">
+            <a:schemeClr val="tx1"/>
+          </a:fontRef>
+        </p:style>
+      </p:cxnSp>
+      <p:sp>
+        <p:nvSpPr>
+          <p:cNvPr id="68" name="TextBox 67">
+            <a:extLst>
+              <a:ext uri="{FF2B5EF4-FFF2-40B4-BE49-F238E27FC236}">
+                <a16:creationId xmlns:a16="http://schemas.microsoft.com/office/drawing/2014/main" id="{3B904169-8C52-493A-8B67-6F2F821528CC}"/>
+              </a:ext>
+            </a:extLst>
+          </p:cNvPr>
+          <p:cNvSpPr txBox="1"/>
+          <p:nvPr/>
+        </p:nvSpPr>
+        <p:spPr>
+          <a:xfrm>
+            <a:off x="1828873" y="4794811"/>
+            <a:ext cx="1961045" cy="738664"/>
+          </a:xfrm>
+          <a:prstGeom prst="rect">
+            <a:avLst/>
+          </a:prstGeom>
+          <a:noFill/>
+        </p:spPr>
+        <p:txBody>
+          <a:bodyPr wrap="square" rtlCol="0">
+            <a:spAutoFit/>
+          </a:bodyPr>
+          <a:lstStyle/>
+          <a:p>
+            <a:r>
+              <a:rPr lang="en-US" sz="1400" i="1" dirty="0"/>
+              <a:t>Hello, I’d like to order a supreme pizza.</a:t>
+            </a:r>
+          </a:p>
+          <a:p>
+            <a:r>
+              <a:rPr lang="en-US" sz="1400" i="1" dirty="0"/>
+              <a:t>Goodbye.</a:t>
+            </a:r>
+          </a:p>
+        </p:txBody>
+      </p:sp>
+      <p:pic>
+        <p:nvPicPr>
+          <p:cNvPr id="69" name="Picture 68" descr="A person talking on a cell phone&#10;&#10;Description automatically generated">
+            <a:extLst>
+              <a:ext uri="{FF2B5EF4-FFF2-40B4-BE49-F238E27FC236}">
+                <a16:creationId xmlns:a16="http://schemas.microsoft.com/office/drawing/2014/main" id="{1D4C17B4-0BDB-4CBA-A402-BF8C345A0CB3}"/>
+              </a:ext>
+            </a:extLst>
+          </p:cNvPr>
+          <p:cNvPicPr>
+            <a:picLocks noChangeAspect="1"/>
+          </p:cNvPicPr>
+          <p:nvPr/>
+        </p:nvPicPr>
+        <p:blipFill rotWithShape="1">
+          <a:blip r:embed="rId2">
+            <a:extLst>
+              <a:ext uri="{28A0092B-C50C-407E-A947-70E740481C1C}">
+                <a14:useLocalDpi xmlns:a14="http://schemas.microsoft.com/office/drawing/2010/main" val="0"/>
+              </a:ext>
+            </a:extLst>
+          </a:blip>
+          <a:srcRect r="38919"/>
+          <a:stretch/>
+        </p:blipFill>
+        <p:spPr>
+          <a:xfrm>
+            <a:off x="7251299" y="3346765"/>
+            <a:ext cx="970449" cy="1059189"/>
+          </a:xfrm>
+          <a:prstGeom prst="rect">
+            <a:avLst/>
+          </a:prstGeom>
+        </p:spPr>
+      </p:pic>
+      <p:pic>
+        <p:nvPicPr>
+          <p:cNvPr id="70" name="Picture 69" descr="A picture containing person, person, table, piece&#10;&#10;Description automatically generated">
+            <a:extLst>
+              <a:ext uri="{FF2B5EF4-FFF2-40B4-BE49-F238E27FC236}">
+                <a16:creationId xmlns:a16="http://schemas.microsoft.com/office/drawing/2014/main" id="{5CC5A046-21E3-49AA-8793-BFA5EF7A51CD}"/>
+              </a:ext>
+            </a:extLst>
+          </p:cNvPr>
+          <p:cNvPicPr>
+            <a:picLocks noChangeAspect="1"/>
+          </p:cNvPicPr>
+          <p:nvPr/>
+        </p:nvPicPr>
+        <p:blipFill>
+          <a:blip r:embed="rId3">
+            <a:extLst>
+              <a:ext uri="{28A0092B-C50C-407E-A947-70E740481C1C}">
+                <a14:useLocalDpi xmlns:a14="http://schemas.microsoft.com/office/drawing/2010/main" val="0"/>
+              </a:ext>
+            </a:extLst>
+          </a:blip>
+          <a:stretch>
+            <a:fillRect/>
+          </a:stretch>
+        </p:blipFill>
+        <p:spPr>
+          <a:xfrm>
+            <a:off x="10487448" y="3349606"/>
+            <a:ext cx="704232" cy="1056348"/>
+          </a:xfrm>
+          <a:prstGeom prst="rect">
+            <a:avLst/>
+          </a:prstGeom>
+        </p:spPr>
+      </p:pic>
+      <p:cxnSp>
+        <p:nvCxnSpPr>
+          <p:cNvPr id="71" name="Straight Arrow Connector 70">
+            <a:extLst>
+              <a:ext uri="{FF2B5EF4-FFF2-40B4-BE49-F238E27FC236}">
+                <a16:creationId xmlns:a16="http://schemas.microsoft.com/office/drawing/2014/main" id="{C5659BF7-725C-43B6-85D9-1B3EC65D5827}"/>
+              </a:ext>
+            </a:extLst>
+          </p:cNvPr>
+          <p:cNvCxnSpPr>
+            <a:cxnSpLocks/>
+            <a:stCxn id="69" idx="3"/>
+            <a:endCxn id="70" idx="1"/>
+          </p:cNvCxnSpPr>
+          <p:nvPr/>
+        </p:nvCxnSpPr>
+        <p:spPr>
+          <a:xfrm>
+            <a:off x="8221748" y="3876360"/>
+            <a:ext cx="2265700" cy="1420"/>
+          </a:xfrm>
+          <a:prstGeom prst="straightConnector1">
+            <a:avLst/>
+          </a:prstGeom>
+          <a:ln w="28575">
+            <a:solidFill>
+              <a:schemeClr val="accent6"/>
+            </a:solidFill>
+            <a:tailEnd type="triangle"/>
+          </a:ln>
+        </p:spPr>
+        <p:style>
+          <a:lnRef idx="1">
+            <a:schemeClr val="accent1"/>
+          </a:lnRef>
+          <a:fillRef idx="0">
+            <a:schemeClr val="accent1"/>
+          </a:fillRef>
+          <a:effectRef idx="0">
+            <a:schemeClr val="accent1"/>
+          </a:effectRef>
+          <a:fontRef idx="minor">
+            <a:schemeClr val="tx1"/>
+          </a:fontRef>
+        </p:style>
+      </p:cxnSp>
+      <p:sp>
+        <p:nvSpPr>
+          <p:cNvPr id="72" name="TextBox 71">
+            <a:extLst>
+              <a:ext uri="{FF2B5EF4-FFF2-40B4-BE49-F238E27FC236}">
+                <a16:creationId xmlns:a16="http://schemas.microsoft.com/office/drawing/2014/main" id="{7A38F0C9-4ECC-4956-B205-2E36137CA394}"/>
+              </a:ext>
+            </a:extLst>
+          </p:cNvPr>
+          <p:cNvSpPr txBox="1"/>
+          <p:nvPr/>
+        </p:nvSpPr>
+        <p:spPr>
+          <a:xfrm>
+            <a:off x="8374075" y="3403009"/>
+            <a:ext cx="1961045" cy="1169551"/>
+          </a:xfrm>
+          <a:prstGeom prst="rect">
+            <a:avLst/>
+          </a:prstGeom>
+          <a:noFill/>
+        </p:spPr>
+        <p:txBody>
+          <a:bodyPr wrap="square" rtlCol="0">
+            <a:spAutoFit/>
+          </a:bodyPr>
+          <a:lstStyle/>
+          <a:p>
+            <a:r>
+              <a:rPr lang="en-US" sz="1400" i="1" dirty="0"/>
+              <a:t>Hello, I’d like to order a cheese pizza, </a:t>
+            </a:r>
+          </a:p>
+          <a:p>
+            <a:r>
+              <a:rPr lang="en-US" sz="1400" i="1" dirty="0"/>
+              <a:t>A pepperoni pizza, </a:t>
+            </a:r>
+          </a:p>
+          <a:p>
+            <a:r>
+              <a:rPr lang="en-US" sz="1400" i="1" dirty="0"/>
+              <a:t>and a supreme pizza.</a:t>
+            </a:r>
+          </a:p>
+          <a:p>
+            <a:r>
+              <a:rPr lang="en-US" sz="1400" i="1" dirty="0"/>
+              <a:t>Goodbye.</a:t>
+            </a:r>
+          </a:p>
+        </p:txBody>
+      </p:sp>
+    </p:spTree>
+    <p:extLst>
+      <p:ext uri="{BB962C8B-B14F-4D97-AF65-F5344CB8AC3E}">
+        <p14:creationId xmlns:p14="http://schemas.microsoft.com/office/powerpoint/2010/main" val="1097698168"/>
       </p:ext>
     </p:extLst>
   </p:cSld>

</xml_diff>